<commit_message>
Dodati jos dva eksperimenta
</commit_message>
<xml_diff>
--- a/Tehnike i metode analize podataka - Danica Djordjevic 1121 Prezentacijaa.pptx
+++ b/Tehnike i metode analize podataka - Danica Djordjevic 1121 Prezentacijaa.pptx
@@ -5,7 +5,7 @@
     <p:sldMasterId id="2147483677" r:id="rId1"/>
   </p:sldMasterIdLst>
   <p:notesMasterIdLst>
-    <p:notesMasterId r:id="rId17"/>
+    <p:notesMasterId r:id="rId21"/>
   </p:notesMasterIdLst>
   <p:sldIdLst>
     <p:sldId id="256" r:id="rId2"/>
@@ -15,38 +15,42 @@
     <p:sldId id="317" r:id="rId6"/>
     <p:sldId id="318" r:id="rId7"/>
     <p:sldId id="320" r:id="rId8"/>
-    <p:sldId id="319" r:id="rId9"/>
-    <p:sldId id="321" r:id="rId10"/>
-    <p:sldId id="322" r:id="rId11"/>
-    <p:sldId id="325" r:id="rId12"/>
-    <p:sldId id="323" r:id="rId13"/>
-    <p:sldId id="324" r:id="rId14"/>
-    <p:sldId id="274" r:id="rId15"/>
-    <p:sldId id="280" r:id="rId16"/>
+    <p:sldId id="321" r:id="rId9"/>
+    <p:sldId id="322" r:id="rId10"/>
+    <p:sldId id="325" r:id="rId11"/>
+    <p:sldId id="323" r:id="rId12"/>
+    <p:sldId id="324" r:id="rId13"/>
+    <p:sldId id="326" r:id="rId14"/>
+    <p:sldId id="319" r:id="rId15"/>
+    <p:sldId id="327" r:id="rId16"/>
+    <p:sldId id="328" r:id="rId17"/>
+    <p:sldId id="329" r:id="rId18"/>
+    <p:sldId id="274" r:id="rId19"/>
+    <p:sldId id="280" r:id="rId20"/>
   </p:sldIdLst>
   <p:sldSz cx="9144000" cy="5143500" type="screen16x9"/>
   <p:notesSz cx="6858000" cy="9144000"/>
   <p:embeddedFontLst>
     <p:embeddedFont>
       <p:font typeface="Exo 2" panose="020B0604020202020204" charset="0"/>
-      <p:regular r:id="rId18"/>
-      <p:bold r:id="rId19"/>
-      <p:italic r:id="rId20"/>
-      <p:boldItalic r:id="rId21"/>
-    </p:embeddedFont>
-    <p:embeddedFont>
-      <p:font typeface="Fira Sans Extra Condensed Medium" panose="020B0604020202020204" charset="0"/>
       <p:regular r:id="rId22"/>
       <p:bold r:id="rId23"/>
       <p:italic r:id="rId24"/>
       <p:boldItalic r:id="rId25"/>
     </p:embeddedFont>
     <p:embeddedFont>
-      <p:font typeface="Roboto Condensed Light" panose="02000000000000000000" pitchFamily="2" charset="0"/>
+      <p:font typeface="Fira Sans Extra Condensed Medium" panose="020B0604020202020204" charset="0"/>
       <p:regular r:id="rId26"/>
       <p:bold r:id="rId27"/>
       <p:italic r:id="rId28"/>
       <p:boldItalic r:id="rId29"/>
+    </p:embeddedFont>
+    <p:embeddedFont>
+      <p:font typeface="Roboto Condensed Light" panose="02000000000000000000" pitchFamily="2" charset="0"/>
+      <p:regular r:id="rId30"/>
+      <p:bold r:id="rId31"/>
+      <p:italic r:id="rId32"/>
+      <p:boldItalic r:id="rId33"/>
     </p:embeddedFont>
   </p:embeddedFontLst>
   <p:defaultTextStyle>
@@ -930,7 +934,7 @@
     </p:spTree>
     <p:extLst>
       <p:ext uri="{BB962C8B-B14F-4D97-AF65-F5344CB8AC3E}">
-        <p14:creationId xmlns:p14="http://schemas.microsoft.com/office/powerpoint/2010/main" val="1160074780"/>
+        <p14:creationId xmlns:p14="http://schemas.microsoft.com/office/powerpoint/2010/main" val="1400130802"/>
       </p:ext>
     </p:extLst>
   </p:cSld>
@@ -1039,7 +1043,7 @@
     </p:spTree>
     <p:extLst>
       <p:ext uri="{BB962C8B-B14F-4D97-AF65-F5344CB8AC3E}">
-        <p14:creationId xmlns:p14="http://schemas.microsoft.com/office/powerpoint/2010/main" val="1400130802"/>
+        <p14:creationId xmlns:p14="http://schemas.microsoft.com/office/powerpoint/2010/main" val="3902463297"/>
       </p:ext>
     </p:extLst>
   </p:cSld>
@@ -1148,7 +1152,7 @@
     </p:spTree>
     <p:extLst>
       <p:ext uri="{BB962C8B-B14F-4D97-AF65-F5344CB8AC3E}">
-        <p14:creationId xmlns:p14="http://schemas.microsoft.com/office/powerpoint/2010/main" val="3902463297"/>
+        <p14:creationId xmlns:p14="http://schemas.microsoft.com/office/powerpoint/2010/main" val="1828525618"/>
       </p:ext>
     </p:extLst>
   </p:cSld>
@@ -1257,7 +1261,7 @@
     </p:spTree>
     <p:extLst>
       <p:ext uri="{BB962C8B-B14F-4D97-AF65-F5344CB8AC3E}">
-        <p14:creationId xmlns:p14="http://schemas.microsoft.com/office/powerpoint/2010/main" val="1828525618"/>
+        <p14:creationId xmlns:p14="http://schemas.microsoft.com/office/powerpoint/2010/main" val="3975566625"/>
       </p:ext>
     </p:extLst>
   </p:cSld>
@@ -1268,6 +1272,442 @@
 </file>
 
 <file path=ppt/notesSlides/notesSlide14.xml><?xml version="1.0" encoding="utf-8"?>
+<p:notes xmlns:a="http://schemas.openxmlformats.org/drawingml/2006/main" xmlns:r="http://schemas.openxmlformats.org/officeDocument/2006/relationships" xmlns:p="http://schemas.openxmlformats.org/presentationml/2006/main" showMasterSp="0" showMasterPhAnim="0">
+  <p:cSld>
+    <p:spTree>
+      <p:nvGrpSpPr>
+        <p:cNvPr id="1" name="Shape 154"/>
+        <p:cNvGrpSpPr/>
+        <p:nvPr/>
+      </p:nvGrpSpPr>
+      <p:grpSpPr>
+        <a:xfrm>
+          <a:off x="0" y="0"/>
+          <a:ext cx="0" cy="0"/>
+          <a:chOff x="0" y="0"/>
+          <a:chExt cx="0" cy="0"/>
+        </a:xfrm>
+      </p:grpSpPr>
+      <p:sp>
+        <p:nvSpPr>
+          <p:cNvPr id="155" name="Google Shape;155;g9baafe93df_0_310:notes"/>
+          <p:cNvSpPr>
+            <a:spLocks noGrp="1" noRot="1" noChangeAspect="1"/>
+          </p:cNvSpPr>
+          <p:nvPr>
+            <p:ph type="sldImg" idx="2"/>
+          </p:nvPr>
+        </p:nvSpPr>
+        <p:spPr>
+          <a:xfrm>
+            <a:off x="381000" y="685800"/>
+            <a:ext cx="6096000" cy="3429000"/>
+          </a:xfrm>
+          <a:custGeom>
+            <a:avLst/>
+            <a:gdLst/>
+            <a:ahLst/>
+            <a:cxnLst/>
+            <a:rect l="l" t="t" r="r" b="b"/>
+            <a:pathLst>
+              <a:path w="120000" h="120000" extrusionOk="0">
+                <a:moveTo>
+                  <a:pt x="0" y="0"/>
+                </a:moveTo>
+                <a:lnTo>
+                  <a:pt x="120000" y="0"/>
+                </a:lnTo>
+                <a:lnTo>
+                  <a:pt x="120000" y="120000"/>
+                </a:lnTo>
+                <a:lnTo>
+                  <a:pt x="0" y="120000"/>
+                </a:lnTo>
+                <a:close/>
+              </a:path>
+            </a:pathLst>
+          </a:custGeom>
+        </p:spPr>
+      </p:sp>
+      <p:sp>
+        <p:nvSpPr>
+          <p:cNvPr id="156" name="Google Shape;156;g9baafe93df_0_310:notes"/>
+          <p:cNvSpPr txBox="1">
+            <a:spLocks noGrp="1"/>
+          </p:cNvSpPr>
+          <p:nvPr>
+            <p:ph type="body" idx="1"/>
+          </p:nvPr>
+        </p:nvSpPr>
+        <p:spPr>
+          <a:xfrm>
+            <a:off x="685800" y="4343400"/>
+            <a:ext cx="5486400" cy="4114800"/>
+          </a:xfrm>
+          <a:prstGeom prst="rect">
+            <a:avLst/>
+          </a:prstGeom>
+        </p:spPr>
+        <p:txBody>
+          <a:bodyPr spcFirstLastPara="1" wrap="square" lIns="91425" tIns="91425" rIns="91425" bIns="91425" anchor="t" anchorCtr="0">
+            <a:noAutofit/>
+          </a:bodyPr>
+          <a:lstStyle/>
+          <a:p>
+            <a:pPr marL="0" lvl="0" indent="0" algn="l" rtl="0">
+              <a:spcBef>
+                <a:spcPts val="0"/>
+              </a:spcBef>
+              <a:spcAft>
+                <a:spcPts val="0"/>
+              </a:spcAft>
+              <a:buNone/>
+            </a:pPr>
+            <a:endParaRPr/>
+          </a:p>
+        </p:txBody>
+      </p:sp>
+    </p:spTree>
+    <p:extLst>
+      <p:ext uri="{BB962C8B-B14F-4D97-AF65-F5344CB8AC3E}">
+        <p14:creationId xmlns:p14="http://schemas.microsoft.com/office/powerpoint/2010/main" val="33967787"/>
+      </p:ext>
+    </p:extLst>
+  </p:cSld>
+  <p:clrMapOvr>
+    <a:masterClrMapping/>
+  </p:clrMapOvr>
+</p:notes>
+</file>
+
+<file path=ppt/notesSlides/notesSlide15.xml><?xml version="1.0" encoding="utf-8"?>
+<p:notes xmlns:a="http://schemas.openxmlformats.org/drawingml/2006/main" xmlns:r="http://schemas.openxmlformats.org/officeDocument/2006/relationships" xmlns:p="http://schemas.openxmlformats.org/presentationml/2006/main" showMasterSp="0" showMasterPhAnim="0">
+  <p:cSld>
+    <p:spTree>
+      <p:nvGrpSpPr>
+        <p:cNvPr id="1" name="Shape 154"/>
+        <p:cNvGrpSpPr/>
+        <p:nvPr/>
+      </p:nvGrpSpPr>
+      <p:grpSpPr>
+        <a:xfrm>
+          <a:off x="0" y="0"/>
+          <a:ext cx="0" cy="0"/>
+          <a:chOff x="0" y="0"/>
+          <a:chExt cx="0" cy="0"/>
+        </a:xfrm>
+      </p:grpSpPr>
+      <p:sp>
+        <p:nvSpPr>
+          <p:cNvPr id="155" name="Google Shape;155;g9baafe93df_0_310:notes"/>
+          <p:cNvSpPr>
+            <a:spLocks noGrp="1" noRot="1" noChangeAspect="1"/>
+          </p:cNvSpPr>
+          <p:nvPr>
+            <p:ph type="sldImg" idx="2"/>
+          </p:nvPr>
+        </p:nvSpPr>
+        <p:spPr>
+          <a:xfrm>
+            <a:off x="381000" y="685800"/>
+            <a:ext cx="6096000" cy="3429000"/>
+          </a:xfrm>
+          <a:custGeom>
+            <a:avLst/>
+            <a:gdLst/>
+            <a:ahLst/>
+            <a:cxnLst/>
+            <a:rect l="l" t="t" r="r" b="b"/>
+            <a:pathLst>
+              <a:path w="120000" h="120000" extrusionOk="0">
+                <a:moveTo>
+                  <a:pt x="0" y="0"/>
+                </a:moveTo>
+                <a:lnTo>
+                  <a:pt x="120000" y="0"/>
+                </a:lnTo>
+                <a:lnTo>
+                  <a:pt x="120000" y="120000"/>
+                </a:lnTo>
+                <a:lnTo>
+                  <a:pt x="0" y="120000"/>
+                </a:lnTo>
+                <a:close/>
+              </a:path>
+            </a:pathLst>
+          </a:custGeom>
+        </p:spPr>
+      </p:sp>
+      <p:sp>
+        <p:nvSpPr>
+          <p:cNvPr id="156" name="Google Shape;156;g9baafe93df_0_310:notes"/>
+          <p:cNvSpPr txBox="1">
+            <a:spLocks noGrp="1"/>
+          </p:cNvSpPr>
+          <p:nvPr>
+            <p:ph type="body" idx="1"/>
+          </p:nvPr>
+        </p:nvSpPr>
+        <p:spPr>
+          <a:xfrm>
+            <a:off x="685800" y="4343400"/>
+            <a:ext cx="5486400" cy="4114800"/>
+          </a:xfrm>
+          <a:prstGeom prst="rect">
+            <a:avLst/>
+          </a:prstGeom>
+        </p:spPr>
+        <p:txBody>
+          <a:bodyPr spcFirstLastPara="1" wrap="square" lIns="91425" tIns="91425" rIns="91425" bIns="91425" anchor="t" anchorCtr="0">
+            <a:noAutofit/>
+          </a:bodyPr>
+          <a:lstStyle/>
+          <a:p>
+            <a:pPr marL="0" lvl="0" indent="0" algn="l" rtl="0">
+              <a:spcBef>
+                <a:spcPts val="0"/>
+              </a:spcBef>
+              <a:spcAft>
+                <a:spcPts val="0"/>
+              </a:spcAft>
+              <a:buNone/>
+            </a:pPr>
+            <a:endParaRPr/>
+          </a:p>
+        </p:txBody>
+      </p:sp>
+    </p:spTree>
+    <p:extLst>
+      <p:ext uri="{BB962C8B-B14F-4D97-AF65-F5344CB8AC3E}">
+        <p14:creationId xmlns:p14="http://schemas.microsoft.com/office/powerpoint/2010/main" val="3078104862"/>
+      </p:ext>
+    </p:extLst>
+  </p:cSld>
+  <p:clrMapOvr>
+    <a:masterClrMapping/>
+  </p:clrMapOvr>
+</p:notes>
+</file>
+
+<file path=ppt/notesSlides/notesSlide16.xml><?xml version="1.0" encoding="utf-8"?>
+<p:notes xmlns:a="http://schemas.openxmlformats.org/drawingml/2006/main" xmlns:r="http://schemas.openxmlformats.org/officeDocument/2006/relationships" xmlns:p="http://schemas.openxmlformats.org/presentationml/2006/main" showMasterSp="0" showMasterPhAnim="0">
+  <p:cSld>
+    <p:spTree>
+      <p:nvGrpSpPr>
+        <p:cNvPr id="1" name="Shape 154"/>
+        <p:cNvGrpSpPr/>
+        <p:nvPr/>
+      </p:nvGrpSpPr>
+      <p:grpSpPr>
+        <a:xfrm>
+          <a:off x="0" y="0"/>
+          <a:ext cx="0" cy="0"/>
+          <a:chOff x="0" y="0"/>
+          <a:chExt cx="0" cy="0"/>
+        </a:xfrm>
+      </p:grpSpPr>
+      <p:sp>
+        <p:nvSpPr>
+          <p:cNvPr id="155" name="Google Shape;155;g9baafe93df_0_310:notes"/>
+          <p:cNvSpPr>
+            <a:spLocks noGrp="1" noRot="1" noChangeAspect="1"/>
+          </p:cNvSpPr>
+          <p:nvPr>
+            <p:ph type="sldImg" idx="2"/>
+          </p:nvPr>
+        </p:nvSpPr>
+        <p:spPr>
+          <a:xfrm>
+            <a:off x="381000" y="685800"/>
+            <a:ext cx="6096000" cy="3429000"/>
+          </a:xfrm>
+          <a:custGeom>
+            <a:avLst/>
+            <a:gdLst/>
+            <a:ahLst/>
+            <a:cxnLst/>
+            <a:rect l="l" t="t" r="r" b="b"/>
+            <a:pathLst>
+              <a:path w="120000" h="120000" extrusionOk="0">
+                <a:moveTo>
+                  <a:pt x="0" y="0"/>
+                </a:moveTo>
+                <a:lnTo>
+                  <a:pt x="120000" y="0"/>
+                </a:lnTo>
+                <a:lnTo>
+                  <a:pt x="120000" y="120000"/>
+                </a:lnTo>
+                <a:lnTo>
+                  <a:pt x="0" y="120000"/>
+                </a:lnTo>
+                <a:close/>
+              </a:path>
+            </a:pathLst>
+          </a:custGeom>
+        </p:spPr>
+      </p:sp>
+      <p:sp>
+        <p:nvSpPr>
+          <p:cNvPr id="156" name="Google Shape;156;g9baafe93df_0_310:notes"/>
+          <p:cNvSpPr txBox="1">
+            <a:spLocks noGrp="1"/>
+          </p:cNvSpPr>
+          <p:nvPr>
+            <p:ph type="body" idx="1"/>
+          </p:nvPr>
+        </p:nvSpPr>
+        <p:spPr>
+          <a:xfrm>
+            <a:off x="685800" y="4343400"/>
+            <a:ext cx="5486400" cy="4114800"/>
+          </a:xfrm>
+          <a:prstGeom prst="rect">
+            <a:avLst/>
+          </a:prstGeom>
+        </p:spPr>
+        <p:txBody>
+          <a:bodyPr spcFirstLastPara="1" wrap="square" lIns="91425" tIns="91425" rIns="91425" bIns="91425" anchor="t" anchorCtr="0">
+            <a:noAutofit/>
+          </a:bodyPr>
+          <a:lstStyle/>
+          <a:p>
+            <a:pPr marL="0" lvl="0" indent="0" algn="l" rtl="0">
+              <a:spcBef>
+                <a:spcPts val="0"/>
+              </a:spcBef>
+              <a:spcAft>
+                <a:spcPts val="0"/>
+              </a:spcAft>
+              <a:buNone/>
+            </a:pPr>
+            <a:endParaRPr/>
+          </a:p>
+        </p:txBody>
+      </p:sp>
+    </p:spTree>
+    <p:extLst>
+      <p:ext uri="{BB962C8B-B14F-4D97-AF65-F5344CB8AC3E}">
+        <p14:creationId xmlns:p14="http://schemas.microsoft.com/office/powerpoint/2010/main" val="4273444422"/>
+      </p:ext>
+    </p:extLst>
+  </p:cSld>
+  <p:clrMapOvr>
+    <a:masterClrMapping/>
+  </p:clrMapOvr>
+</p:notes>
+</file>
+
+<file path=ppt/notesSlides/notesSlide17.xml><?xml version="1.0" encoding="utf-8"?>
+<p:notes xmlns:a="http://schemas.openxmlformats.org/drawingml/2006/main" xmlns:r="http://schemas.openxmlformats.org/officeDocument/2006/relationships" xmlns:p="http://schemas.openxmlformats.org/presentationml/2006/main" showMasterSp="0" showMasterPhAnim="0">
+  <p:cSld>
+    <p:spTree>
+      <p:nvGrpSpPr>
+        <p:cNvPr id="1" name="Shape 154"/>
+        <p:cNvGrpSpPr/>
+        <p:nvPr/>
+      </p:nvGrpSpPr>
+      <p:grpSpPr>
+        <a:xfrm>
+          <a:off x="0" y="0"/>
+          <a:ext cx="0" cy="0"/>
+          <a:chOff x="0" y="0"/>
+          <a:chExt cx="0" cy="0"/>
+        </a:xfrm>
+      </p:grpSpPr>
+      <p:sp>
+        <p:nvSpPr>
+          <p:cNvPr id="155" name="Google Shape;155;g9baafe93df_0_310:notes"/>
+          <p:cNvSpPr>
+            <a:spLocks noGrp="1" noRot="1" noChangeAspect="1"/>
+          </p:cNvSpPr>
+          <p:nvPr>
+            <p:ph type="sldImg" idx="2"/>
+          </p:nvPr>
+        </p:nvSpPr>
+        <p:spPr>
+          <a:xfrm>
+            <a:off x="381000" y="685800"/>
+            <a:ext cx="6096000" cy="3429000"/>
+          </a:xfrm>
+          <a:custGeom>
+            <a:avLst/>
+            <a:gdLst/>
+            <a:ahLst/>
+            <a:cxnLst/>
+            <a:rect l="l" t="t" r="r" b="b"/>
+            <a:pathLst>
+              <a:path w="120000" h="120000" extrusionOk="0">
+                <a:moveTo>
+                  <a:pt x="0" y="0"/>
+                </a:moveTo>
+                <a:lnTo>
+                  <a:pt x="120000" y="0"/>
+                </a:lnTo>
+                <a:lnTo>
+                  <a:pt x="120000" y="120000"/>
+                </a:lnTo>
+                <a:lnTo>
+                  <a:pt x="0" y="120000"/>
+                </a:lnTo>
+                <a:close/>
+              </a:path>
+            </a:pathLst>
+          </a:custGeom>
+        </p:spPr>
+      </p:sp>
+      <p:sp>
+        <p:nvSpPr>
+          <p:cNvPr id="156" name="Google Shape;156;g9baafe93df_0_310:notes"/>
+          <p:cNvSpPr txBox="1">
+            <a:spLocks noGrp="1"/>
+          </p:cNvSpPr>
+          <p:nvPr>
+            <p:ph type="body" idx="1"/>
+          </p:nvPr>
+        </p:nvSpPr>
+        <p:spPr>
+          <a:xfrm>
+            <a:off x="685800" y="4343400"/>
+            <a:ext cx="5486400" cy="4114800"/>
+          </a:xfrm>
+          <a:prstGeom prst="rect">
+            <a:avLst/>
+          </a:prstGeom>
+        </p:spPr>
+        <p:txBody>
+          <a:bodyPr spcFirstLastPara="1" wrap="square" lIns="91425" tIns="91425" rIns="91425" bIns="91425" anchor="t" anchorCtr="0">
+            <a:noAutofit/>
+          </a:bodyPr>
+          <a:lstStyle/>
+          <a:p>
+            <a:pPr marL="0" lvl="0" indent="0" algn="l" rtl="0">
+              <a:spcBef>
+                <a:spcPts val="0"/>
+              </a:spcBef>
+              <a:spcAft>
+                <a:spcPts val="0"/>
+              </a:spcAft>
+              <a:buNone/>
+            </a:pPr>
+            <a:endParaRPr/>
+          </a:p>
+        </p:txBody>
+      </p:sp>
+    </p:spTree>
+    <p:extLst>
+      <p:ext uri="{BB962C8B-B14F-4D97-AF65-F5344CB8AC3E}">
+        <p14:creationId xmlns:p14="http://schemas.microsoft.com/office/powerpoint/2010/main" val="1405558647"/>
+      </p:ext>
+    </p:extLst>
+  </p:cSld>
+  <p:clrMapOvr>
+    <a:masterClrMapping/>
+  </p:clrMapOvr>
+</p:notes>
+</file>
+
+<file path=ppt/notesSlides/notesSlide18.xml><?xml version="1.0" encoding="utf-8"?>
 <p:notes xmlns:a="http://schemas.openxmlformats.org/drawingml/2006/main" xmlns:r="http://schemas.openxmlformats.org/officeDocument/2006/relationships" xmlns:p="http://schemas.openxmlformats.org/presentationml/2006/main" showMasterSp="0" showMasterPhAnim="0">
   <p:cSld>
     <p:spTree>
@@ -1371,7 +1811,7 @@
 </p:notes>
 </file>
 
-<file path=ppt/notesSlides/notesSlide15.xml><?xml version="1.0" encoding="utf-8"?>
+<file path=ppt/notesSlides/notesSlide19.xml><?xml version="1.0" encoding="utf-8"?>
 <p:notes xmlns:a="http://schemas.openxmlformats.org/drawingml/2006/main" xmlns:r="http://schemas.openxmlformats.org/officeDocument/2006/relationships" xmlns:p="http://schemas.openxmlformats.org/presentationml/2006/main" showMasterSp="0" showMasterPhAnim="0">
   <p:cSld>
     <p:spTree>
@@ -2223,7 +2663,7 @@
     </p:spTree>
     <p:extLst>
       <p:ext uri="{BB962C8B-B14F-4D97-AF65-F5344CB8AC3E}">
-        <p14:creationId xmlns:p14="http://schemas.microsoft.com/office/powerpoint/2010/main" val="33967787"/>
+        <p14:creationId xmlns:p14="http://schemas.microsoft.com/office/powerpoint/2010/main" val="675646758"/>
       </p:ext>
     </p:extLst>
   </p:cSld>
@@ -2332,7 +2772,7 @@
     </p:spTree>
     <p:extLst>
       <p:ext uri="{BB962C8B-B14F-4D97-AF65-F5344CB8AC3E}">
-        <p14:creationId xmlns:p14="http://schemas.microsoft.com/office/powerpoint/2010/main" val="675646758"/>
+        <p14:creationId xmlns:p14="http://schemas.microsoft.com/office/powerpoint/2010/main" val="1160074780"/>
       </p:ext>
     </p:extLst>
   </p:cSld>
@@ -6450,318 +6890,6 @@
             </a:pPr>
             <a:r>
               <a:rPr lang="sr-Latn-RS" dirty="0"/>
-              <a:t>Preprocesiranje </a:t>
-            </a:r>
-            <a:endParaRPr dirty="0"/>
-          </a:p>
-        </p:txBody>
-      </p:sp>
-      <p:sp>
-        <p:nvSpPr>
-          <p:cNvPr id="17" name="TextBox 16">
-            <a:extLst>
-              <a:ext uri="{FF2B5EF4-FFF2-40B4-BE49-F238E27FC236}">
-                <a16:creationId xmlns:a16="http://schemas.microsoft.com/office/drawing/2014/main" id="{D9D29EC4-52C0-41DD-99AF-CE6946B349C2}"/>
-              </a:ext>
-            </a:extLst>
-          </p:cNvPr>
-          <p:cNvSpPr txBox="1"/>
-          <p:nvPr/>
-        </p:nvSpPr>
-        <p:spPr>
-          <a:xfrm>
-            <a:off x="5178056" y="1026324"/>
-            <a:ext cx="2615610" cy="307777"/>
-          </a:xfrm>
-          <a:prstGeom prst="rect">
-            <a:avLst/>
-          </a:prstGeom>
-          <a:noFill/>
-        </p:spPr>
-        <p:txBody>
-          <a:bodyPr wrap="square" rtlCol="0">
-            <a:spAutoFit/>
-          </a:bodyPr>
-          <a:lstStyle/>
-          <a:p>
-            <a:r>
-              <a:rPr lang="sr-Latn-RS" dirty="0">
-                <a:solidFill>
-                  <a:srgbClr val="FF0000"/>
-                </a:solidFill>
-              </a:rPr>
-              <a:t>Kros validacija</a:t>
-            </a:r>
-            <a:endParaRPr lang="en-US" dirty="0">
-              <a:solidFill>
-                <a:srgbClr val="FF0000"/>
-              </a:solidFill>
-            </a:endParaRPr>
-          </a:p>
-        </p:txBody>
-      </p:sp>
-      <p:pic>
-        <p:nvPicPr>
-          <p:cNvPr id="8" name="Picture 7">
-            <a:extLst>
-              <a:ext uri="{FF2B5EF4-FFF2-40B4-BE49-F238E27FC236}">
-                <a16:creationId xmlns:a16="http://schemas.microsoft.com/office/drawing/2014/main" id="{2ADC7C43-89E1-41B5-8E7E-E3B60123FB1B}"/>
-              </a:ext>
-            </a:extLst>
-          </p:cNvPr>
-          <p:cNvPicPr/>
-          <p:nvPr/>
-        </p:nvPicPr>
-        <p:blipFill>
-          <a:blip r:embed="rId3"/>
-          <a:stretch>
-            <a:fillRect/>
-          </a:stretch>
-        </p:blipFill>
-        <p:spPr>
-          <a:xfrm>
-            <a:off x="202019" y="908751"/>
-            <a:ext cx="4343400" cy="542925"/>
-          </a:xfrm>
-          <a:prstGeom prst="rect">
-            <a:avLst/>
-          </a:prstGeom>
-          <a:noFill/>
-          <a:ln>
-            <a:noFill/>
-          </a:ln>
-        </p:spPr>
-      </p:pic>
-      <p:cxnSp>
-        <p:nvCxnSpPr>
-          <p:cNvPr id="3" name="Straight Arrow Connector 2">
-            <a:extLst>
-              <a:ext uri="{FF2B5EF4-FFF2-40B4-BE49-F238E27FC236}">
-                <a16:creationId xmlns:a16="http://schemas.microsoft.com/office/drawing/2014/main" id="{E6254F47-47AF-4BF7-808D-377486D5F088}"/>
-              </a:ext>
-            </a:extLst>
-          </p:cNvPr>
-          <p:cNvCxnSpPr>
-            <a:endCxn id="8" idx="3"/>
-          </p:cNvCxnSpPr>
-          <p:nvPr/>
-        </p:nvCxnSpPr>
-        <p:spPr>
-          <a:xfrm flipH="1">
-            <a:off x="4545419" y="1180213"/>
-            <a:ext cx="632637" cy="1"/>
-          </a:xfrm>
-          <a:prstGeom prst="straightConnector1">
-            <a:avLst/>
-          </a:prstGeom>
-          <a:ln>
-            <a:solidFill>
-              <a:srgbClr val="FF0000"/>
-            </a:solidFill>
-            <a:tailEnd type="triangle"/>
-          </a:ln>
-        </p:spPr>
-        <p:style>
-          <a:lnRef idx="1">
-            <a:schemeClr val="accent1"/>
-          </a:lnRef>
-          <a:fillRef idx="0">
-            <a:schemeClr val="accent1"/>
-          </a:fillRef>
-          <a:effectRef idx="0">
-            <a:schemeClr val="accent1"/>
-          </a:effectRef>
-          <a:fontRef idx="minor">
-            <a:schemeClr val="tx1"/>
-          </a:fontRef>
-        </p:style>
-      </p:cxnSp>
-      <p:pic>
-        <p:nvPicPr>
-          <p:cNvPr id="11" name="Picture 10">
-            <a:extLst>
-              <a:ext uri="{FF2B5EF4-FFF2-40B4-BE49-F238E27FC236}">
-                <a16:creationId xmlns:a16="http://schemas.microsoft.com/office/drawing/2014/main" id="{72FE7F5C-A1BC-4894-ADDC-143B08A40ECF}"/>
-              </a:ext>
-            </a:extLst>
-          </p:cNvPr>
-          <p:cNvPicPr/>
-          <p:nvPr/>
-        </p:nvPicPr>
-        <p:blipFill>
-          <a:blip r:embed="rId4"/>
-          <a:stretch>
-            <a:fillRect/>
-          </a:stretch>
-        </p:blipFill>
-        <p:spPr>
-          <a:xfrm>
-            <a:off x="202019" y="3491799"/>
-            <a:ext cx="5686425" cy="942975"/>
-          </a:xfrm>
-          <a:prstGeom prst="rect">
-            <a:avLst/>
-          </a:prstGeom>
-          <a:noFill/>
-          <a:ln>
-            <a:noFill/>
-          </a:ln>
-        </p:spPr>
-      </p:pic>
-      <p:sp>
-        <p:nvSpPr>
-          <p:cNvPr id="5" name="TextBox 4">
-            <a:extLst>
-              <a:ext uri="{FF2B5EF4-FFF2-40B4-BE49-F238E27FC236}">
-                <a16:creationId xmlns:a16="http://schemas.microsoft.com/office/drawing/2014/main" id="{E27A95D0-4CE0-48C2-AD36-6A621DB525CB}"/>
-              </a:ext>
-            </a:extLst>
-          </p:cNvPr>
-          <p:cNvSpPr txBox="1"/>
-          <p:nvPr/>
-        </p:nvSpPr>
-        <p:spPr>
-          <a:xfrm>
-            <a:off x="202019" y="1723138"/>
-            <a:ext cx="6794204" cy="954107"/>
-          </a:xfrm>
-          <a:prstGeom prst="rect">
-            <a:avLst/>
-          </a:prstGeom>
-          <a:noFill/>
-        </p:spPr>
-        <p:txBody>
-          <a:bodyPr wrap="square" rtlCol="0">
-            <a:spAutoFit/>
-          </a:bodyPr>
-          <a:lstStyle/>
-          <a:p>
-            <a:r>
-              <a:rPr lang="sr-Latn-RS" dirty="0">
-                <a:solidFill>
-                  <a:srgbClr val="FF0000"/>
-                </a:solidFill>
-              </a:rPr>
-              <a:t>Priprema neobrađenog skupa podataka, na osnovu koga će se vršiti poređenje. Iz skupa neprocesiranih podataka su izbačene kolone sa nenumeričkim podacima, kao i redovi sa nedostajućim vrednostima. Nenumeričke podatke je neophodno izbaciti, da bi primenjivanje bilo kog algoritma bilo moguće. </a:t>
-            </a:r>
-            <a:endParaRPr lang="en-US" dirty="0">
-              <a:solidFill>
-                <a:srgbClr val="FF0000"/>
-              </a:solidFill>
-            </a:endParaRPr>
-          </a:p>
-        </p:txBody>
-      </p:sp>
-      <p:cxnSp>
-        <p:nvCxnSpPr>
-          <p:cNvPr id="7" name="Straight Arrow Connector 6">
-            <a:extLst>
-              <a:ext uri="{FF2B5EF4-FFF2-40B4-BE49-F238E27FC236}">
-                <a16:creationId xmlns:a16="http://schemas.microsoft.com/office/drawing/2014/main" id="{89025F60-00BF-461C-AE21-FB40DEFEC21C}"/>
-              </a:ext>
-            </a:extLst>
-          </p:cNvPr>
-          <p:cNvCxnSpPr>
-            <a:cxnSpLocks/>
-          </p:cNvCxnSpPr>
-          <p:nvPr/>
-        </p:nvCxnSpPr>
-        <p:spPr>
-          <a:xfrm>
-            <a:off x="3051544" y="2666399"/>
-            <a:ext cx="542262" cy="942975"/>
-          </a:xfrm>
-          <a:prstGeom prst="straightConnector1">
-            <a:avLst/>
-          </a:prstGeom>
-          <a:ln>
-            <a:solidFill>
-              <a:srgbClr val="FF0000"/>
-            </a:solidFill>
-            <a:tailEnd type="triangle"/>
-          </a:ln>
-        </p:spPr>
-        <p:style>
-          <a:lnRef idx="1">
-            <a:schemeClr val="accent1"/>
-          </a:lnRef>
-          <a:fillRef idx="0">
-            <a:schemeClr val="accent1"/>
-          </a:fillRef>
-          <a:effectRef idx="0">
-            <a:schemeClr val="accent1"/>
-          </a:effectRef>
-          <a:fontRef idx="minor">
-            <a:schemeClr val="tx1"/>
-          </a:fontRef>
-        </p:style>
-      </p:cxnSp>
-    </p:spTree>
-    <p:extLst>
-      <p:ext uri="{BB962C8B-B14F-4D97-AF65-F5344CB8AC3E}">
-        <p14:creationId xmlns:p14="http://schemas.microsoft.com/office/powerpoint/2010/main" val="3505508394"/>
-      </p:ext>
-    </p:extLst>
-  </p:cSld>
-  <p:clrMapOvr>
-    <a:masterClrMapping/>
-  </p:clrMapOvr>
-</p:sld>
-</file>
-
-<file path=ppt/slides/slide11.xml><?xml version="1.0" encoding="utf-8"?>
-<p:sld xmlns:a="http://schemas.openxmlformats.org/drawingml/2006/main" xmlns:r="http://schemas.openxmlformats.org/officeDocument/2006/relationships" xmlns:p="http://schemas.openxmlformats.org/presentationml/2006/main">
-  <p:cSld>
-    <p:spTree>
-      <p:nvGrpSpPr>
-        <p:cNvPr id="1" name="Shape 157"/>
-        <p:cNvGrpSpPr/>
-        <p:nvPr/>
-      </p:nvGrpSpPr>
-      <p:grpSpPr>
-        <a:xfrm>
-          <a:off x="0" y="0"/>
-          <a:ext cx="0" cy="0"/>
-          <a:chOff x="0" y="0"/>
-          <a:chExt cx="0" cy="0"/>
-        </a:xfrm>
-      </p:grpSpPr>
-      <p:sp>
-        <p:nvSpPr>
-          <p:cNvPr id="159" name="Google Shape;159;p34"/>
-          <p:cNvSpPr txBox="1">
-            <a:spLocks noGrp="1"/>
-          </p:cNvSpPr>
-          <p:nvPr>
-            <p:ph type="ctrTitle"/>
-          </p:nvPr>
-        </p:nvSpPr>
-        <p:spPr>
-          <a:xfrm>
-            <a:off x="574159" y="56640"/>
-            <a:ext cx="7804298" cy="613271"/>
-          </a:xfrm>
-          <a:prstGeom prst="rect">
-            <a:avLst/>
-          </a:prstGeom>
-        </p:spPr>
-        <p:txBody>
-          <a:bodyPr spcFirstLastPara="1" wrap="square" lIns="91425" tIns="91425" rIns="91425" bIns="91425" anchor="t" anchorCtr="0">
-            <a:noAutofit/>
-          </a:bodyPr>
-          <a:lstStyle/>
-          <a:p>
-            <a:pPr marL="0" lvl="0" indent="0" algn="ctr" rtl="0">
-              <a:spcBef>
-                <a:spcPts val="0"/>
-              </a:spcBef>
-              <a:spcAft>
-                <a:spcPts val="0"/>
-              </a:spcAft>
-              <a:buNone/>
-            </a:pPr>
-            <a:r>
-              <a:rPr lang="sr-Latn-RS" dirty="0"/>
               <a:t>Algoritmi klasifikacije – sklearn biblioteka</a:t>
             </a:r>
             <a:endParaRPr dirty="0"/>
@@ -6934,6 +7062,273 @@
     <p:extLst>
       <p:ext uri="{BB962C8B-B14F-4D97-AF65-F5344CB8AC3E}">
         <p14:creationId xmlns:p14="http://schemas.microsoft.com/office/powerpoint/2010/main" val="3773734499"/>
+      </p:ext>
+    </p:extLst>
+  </p:cSld>
+  <p:clrMapOvr>
+    <a:masterClrMapping/>
+  </p:clrMapOvr>
+</p:sld>
+</file>
+
+<file path=ppt/slides/slide11.xml><?xml version="1.0" encoding="utf-8"?>
+<p:sld xmlns:a="http://schemas.openxmlformats.org/drawingml/2006/main" xmlns:r="http://schemas.openxmlformats.org/officeDocument/2006/relationships" xmlns:p="http://schemas.openxmlformats.org/presentationml/2006/main">
+  <p:cSld>
+    <p:spTree>
+      <p:nvGrpSpPr>
+        <p:cNvPr id="1" name="Shape 157"/>
+        <p:cNvGrpSpPr/>
+        <p:nvPr/>
+      </p:nvGrpSpPr>
+      <p:grpSpPr>
+        <a:xfrm>
+          <a:off x="0" y="0"/>
+          <a:ext cx="0" cy="0"/>
+          <a:chOff x="0" y="0"/>
+          <a:chExt cx="0" cy="0"/>
+        </a:xfrm>
+      </p:grpSpPr>
+      <p:pic>
+        <p:nvPicPr>
+          <p:cNvPr id="9" name="Picture 8">
+            <a:extLst>
+              <a:ext uri="{FF2B5EF4-FFF2-40B4-BE49-F238E27FC236}">
+                <a16:creationId xmlns:a16="http://schemas.microsoft.com/office/drawing/2014/main" id="{D690D3F4-47BA-4D75-A145-DF00DEEA3A8B}"/>
+              </a:ext>
+            </a:extLst>
+          </p:cNvPr>
+          <p:cNvPicPr/>
+          <p:nvPr/>
+        </p:nvPicPr>
+        <p:blipFill>
+          <a:blip r:embed="rId3"/>
+          <a:stretch>
+            <a:fillRect/>
+          </a:stretch>
+        </p:blipFill>
+        <p:spPr>
+          <a:xfrm>
+            <a:off x="4433777" y="977688"/>
+            <a:ext cx="4720857" cy="4165812"/>
+          </a:xfrm>
+          <a:prstGeom prst="rect">
+            <a:avLst/>
+          </a:prstGeom>
+        </p:spPr>
+      </p:pic>
+      <p:pic>
+        <p:nvPicPr>
+          <p:cNvPr id="8" name="Picture 7">
+            <a:extLst>
+              <a:ext uri="{FF2B5EF4-FFF2-40B4-BE49-F238E27FC236}">
+                <a16:creationId xmlns:a16="http://schemas.microsoft.com/office/drawing/2014/main" id="{7BA9CF81-AC3F-477A-B9B0-42EA1A00EAC3}"/>
+              </a:ext>
+            </a:extLst>
+          </p:cNvPr>
+          <p:cNvPicPr/>
+          <p:nvPr/>
+        </p:nvPicPr>
+        <p:blipFill>
+          <a:blip r:embed="rId4"/>
+          <a:stretch>
+            <a:fillRect/>
+          </a:stretch>
+        </p:blipFill>
+        <p:spPr>
+          <a:xfrm>
+            <a:off x="0" y="977688"/>
+            <a:ext cx="4433777" cy="4165812"/>
+          </a:xfrm>
+          <a:prstGeom prst="rect">
+            <a:avLst/>
+          </a:prstGeom>
+        </p:spPr>
+      </p:pic>
+      <p:sp>
+        <p:nvSpPr>
+          <p:cNvPr id="159" name="Google Shape;159;p34"/>
+          <p:cNvSpPr txBox="1">
+            <a:spLocks noGrp="1"/>
+          </p:cNvSpPr>
+          <p:nvPr>
+            <p:ph type="ctrTitle"/>
+          </p:nvPr>
+        </p:nvSpPr>
+        <p:spPr>
+          <a:xfrm>
+            <a:off x="574159" y="56640"/>
+            <a:ext cx="7804298" cy="613271"/>
+          </a:xfrm>
+          <a:prstGeom prst="rect">
+            <a:avLst/>
+          </a:prstGeom>
+        </p:spPr>
+        <p:txBody>
+          <a:bodyPr spcFirstLastPara="1" wrap="square" lIns="91425" tIns="91425" rIns="91425" bIns="91425" anchor="t" anchorCtr="0">
+            <a:noAutofit/>
+          </a:bodyPr>
+          <a:lstStyle/>
+          <a:p>
+            <a:pPr marL="0" lvl="0" indent="0" algn="ctr" rtl="0">
+              <a:spcBef>
+                <a:spcPts val="0"/>
+              </a:spcBef>
+              <a:spcAft>
+                <a:spcPts val="0"/>
+              </a:spcAft>
+              <a:buNone/>
+            </a:pPr>
+            <a:r>
+              <a:rPr lang="sr-Latn-RS" dirty="0"/>
+              <a:t>Komparativna analiza algoritama</a:t>
+            </a:r>
+            <a:r>
+              <a:rPr lang="en-US" dirty="0"/>
+              <a:t> k=10</a:t>
+            </a:r>
+            <a:r>
+              <a:rPr lang="sr-Latn-RS" dirty="0"/>
+              <a:t> </a:t>
+            </a:r>
+            <a:endParaRPr dirty="0"/>
+          </a:p>
+        </p:txBody>
+      </p:sp>
+      <p:sp>
+        <p:nvSpPr>
+          <p:cNvPr id="2" name="TextBox 1">
+            <a:extLst>
+              <a:ext uri="{FF2B5EF4-FFF2-40B4-BE49-F238E27FC236}">
+                <a16:creationId xmlns:a16="http://schemas.microsoft.com/office/drawing/2014/main" id="{2A0632BE-A4D3-40D7-A91F-4964B067A359}"/>
+              </a:ext>
+            </a:extLst>
+          </p:cNvPr>
+          <p:cNvSpPr txBox="1"/>
+          <p:nvPr/>
+        </p:nvSpPr>
+        <p:spPr>
+          <a:xfrm>
+            <a:off x="191386" y="669911"/>
+            <a:ext cx="3030279" cy="307777"/>
+          </a:xfrm>
+          <a:prstGeom prst="rect">
+            <a:avLst/>
+          </a:prstGeom>
+          <a:noFill/>
+        </p:spPr>
+        <p:txBody>
+          <a:bodyPr wrap="square" rtlCol="0">
+            <a:spAutoFit/>
+          </a:bodyPr>
+          <a:lstStyle/>
+          <a:p>
+            <a:r>
+              <a:rPr lang="sr-Latn-RS" dirty="0">
+                <a:solidFill>
+                  <a:srgbClr val="FF0000"/>
+                </a:solidFill>
+              </a:rPr>
+              <a:t>Selekcija K najrelevantnijih atributa</a:t>
+            </a:r>
+            <a:endParaRPr lang="en-US" dirty="0">
+              <a:solidFill>
+                <a:srgbClr val="FF0000"/>
+              </a:solidFill>
+            </a:endParaRPr>
+          </a:p>
+        </p:txBody>
+      </p:sp>
+      <p:sp>
+        <p:nvSpPr>
+          <p:cNvPr id="10" name="TextBox 9">
+            <a:extLst>
+              <a:ext uri="{FF2B5EF4-FFF2-40B4-BE49-F238E27FC236}">
+                <a16:creationId xmlns:a16="http://schemas.microsoft.com/office/drawing/2014/main" id="{6E880D56-6604-40F1-8180-804FC4A3EC7F}"/>
+              </a:ext>
+            </a:extLst>
+          </p:cNvPr>
+          <p:cNvSpPr txBox="1"/>
+          <p:nvPr/>
+        </p:nvSpPr>
+        <p:spPr>
+          <a:xfrm>
+            <a:off x="6645349" y="669911"/>
+            <a:ext cx="1222746" cy="307777"/>
+          </a:xfrm>
+          <a:prstGeom prst="rect">
+            <a:avLst/>
+          </a:prstGeom>
+          <a:noFill/>
+        </p:spPr>
+        <p:txBody>
+          <a:bodyPr wrap="square" rtlCol="0">
+            <a:spAutoFit/>
+          </a:bodyPr>
+          <a:lstStyle/>
+          <a:p>
+            <a:r>
+              <a:rPr lang="sr-Latn-RS" dirty="0">
+                <a:solidFill>
+                  <a:srgbClr val="FF0000"/>
+                </a:solidFill>
+              </a:rPr>
+              <a:t>PCA metoda</a:t>
+            </a:r>
+            <a:endParaRPr lang="en-US" dirty="0">
+              <a:solidFill>
+                <a:srgbClr val="FF0000"/>
+              </a:solidFill>
+            </a:endParaRPr>
+          </a:p>
+        </p:txBody>
+      </p:sp>
+      <p:cxnSp>
+        <p:nvCxnSpPr>
+          <p:cNvPr id="12" name="Straight Connector 11">
+            <a:extLst>
+              <a:ext uri="{FF2B5EF4-FFF2-40B4-BE49-F238E27FC236}">
+                <a16:creationId xmlns:a16="http://schemas.microsoft.com/office/drawing/2014/main" id="{67A471BB-9D4F-4980-A244-09EA9465E846}"/>
+              </a:ext>
+            </a:extLst>
+          </p:cNvPr>
+          <p:cNvCxnSpPr>
+            <a:cxnSpLocks/>
+          </p:cNvCxnSpPr>
+          <p:nvPr/>
+        </p:nvCxnSpPr>
+        <p:spPr>
+          <a:xfrm>
+            <a:off x="4433777" y="977688"/>
+            <a:ext cx="0" cy="4165812"/>
+          </a:xfrm>
+          <a:prstGeom prst="line">
+            <a:avLst/>
+          </a:prstGeom>
+          <a:ln>
+            <a:solidFill>
+              <a:srgbClr val="FF0000"/>
+            </a:solidFill>
+          </a:ln>
+        </p:spPr>
+        <p:style>
+          <a:lnRef idx="1">
+            <a:schemeClr val="accent1"/>
+          </a:lnRef>
+          <a:fillRef idx="0">
+            <a:schemeClr val="accent1"/>
+          </a:fillRef>
+          <a:effectRef idx="0">
+            <a:schemeClr val="accent1"/>
+          </a:effectRef>
+          <a:fontRef idx="minor">
+            <a:schemeClr val="tx1"/>
+          </a:fontRef>
+        </p:style>
+      </p:cxnSp>
+    </p:spTree>
+    <p:extLst>
+      <p:ext uri="{BB962C8B-B14F-4D97-AF65-F5344CB8AC3E}">
+        <p14:creationId xmlns:p14="http://schemas.microsoft.com/office/powerpoint/2010/main" val="1261045065"/>
       </p:ext>
     </p:extLst>
   </p:cSld>
@@ -6996,7 +7391,7 @@
             </a:pPr>
             <a:r>
               <a:rPr lang="sr-Latn-RS" dirty="0"/>
-              <a:t>Komparativna analiza algoritama </a:t>
+              <a:t>Evaluacija algoritama</a:t>
             </a:r>
             <a:endParaRPr dirty="0"/>
           </a:p>
@@ -7004,10 +7399,10 @@
       </p:sp>
       <p:sp>
         <p:nvSpPr>
-          <p:cNvPr id="2" name="TextBox 1">
+          <p:cNvPr id="3" name="TextBox 2">
             <a:extLst>
               <a:ext uri="{FF2B5EF4-FFF2-40B4-BE49-F238E27FC236}">
-                <a16:creationId xmlns:a16="http://schemas.microsoft.com/office/drawing/2014/main" id="{2A0632BE-A4D3-40D7-A91F-4964B067A359}"/>
+                <a16:creationId xmlns:a16="http://schemas.microsoft.com/office/drawing/2014/main" id="{32721BFC-39CB-4C83-8641-4F5A619B1D10}"/>
               </a:ext>
             </a:extLst>
           </p:cNvPr>
@@ -7016,8 +7411,8 @@
         </p:nvSpPr>
         <p:spPr>
           <a:xfrm>
-            <a:off x="191386" y="669911"/>
-            <a:ext cx="3030279" cy="307777"/>
+            <a:off x="361507" y="808074"/>
+            <a:ext cx="7878726" cy="954107"/>
           </a:xfrm>
           <a:prstGeom prst="rect">
             <a:avLst/>
@@ -7031,127 +7426,121 @@
           <a:lstStyle/>
           <a:p>
             <a:r>
-              <a:rPr lang="sr-Latn-RS" dirty="0">
-                <a:solidFill>
-                  <a:srgbClr val="FF0000"/>
-                </a:solidFill>
-              </a:rPr>
-              <a:t>Selekcija K najrelevantnijih atributa</a:t>
-            </a:r>
-            <a:endParaRPr lang="en-US" dirty="0">
-              <a:solidFill>
-                <a:srgbClr val="FF0000"/>
-              </a:solidFill>
-            </a:endParaRPr>
-          </a:p>
-        </p:txBody>
-      </p:sp>
-      <p:sp>
-        <p:nvSpPr>
-          <p:cNvPr id="10" name="TextBox 9">
-            <a:extLst>
-              <a:ext uri="{FF2B5EF4-FFF2-40B4-BE49-F238E27FC236}">
-                <a16:creationId xmlns:a16="http://schemas.microsoft.com/office/drawing/2014/main" id="{6E880D56-6604-40F1-8180-804FC4A3EC7F}"/>
-              </a:ext>
-            </a:extLst>
-          </p:cNvPr>
-          <p:cNvSpPr txBox="1"/>
-          <p:nvPr/>
-        </p:nvSpPr>
-        <p:spPr>
-          <a:xfrm>
-            <a:off x="6645349" y="669911"/>
-            <a:ext cx="1222746" cy="307777"/>
-          </a:xfrm>
-          <a:prstGeom prst="rect">
-            <a:avLst/>
-          </a:prstGeom>
-          <a:noFill/>
-        </p:spPr>
-        <p:txBody>
-          <a:bodyPr wrap="square" rtlCol="0">
-            <a:spAutoFit/>
-          </a:bodyPr>
-          <a:lstStyle/>
-          <a:p>
-            <a:r>
-              <a:rPr lang="sr-Latn-RS" dirty="0">
-                <a:solidFill>
-                  <a:srgbClr val="FF0000"/>
-                </a:solidFill>
-              </a:rPr>
-              <a:t>PCA metoda</a:t>
-            </a:r>
-            <a:endParaRPr lang="en-US" dirty="0">
-              <a:solidFill>
-                <a:srgbClr val="FF0000"/>
-              </a:solidFill>
-            </a:endParaRPr>
+              <a:rPr lang="en-US" dirty="0"/>
+              <a:t>Za </a:t>
+            </a:r>
+            <a:r>
+              <a:rPr lang="en-US" dirty="0" err="1"/>
+              <a:t>evaluaciju</a:t>
+            </a:r>
+            <a:r>
+              <a:rPr lang="en-US" dirty="0"/>
+              <a:t> </a:t>
+            </a:r>
+            <a:r>
+              <a:rPr lang="en-US" dirty="0" err="1"/>
+              <a:t>algoritama</a:t>
+            </a:r>
+            <a:r>
+              <a:rPr lang="en-US" dirty="0"/>
+              <a:t> je </a:t>
+            </a:r>
+            <a:r>
+              <a:rPr lang="en-US" dirty="0" err="1"/>
+              <a:t>korišćena</a:t>
+            </a:r>
+            <a:r>
+              <a:rPr lang="en-US" dirty="0"/>
+              <a:t> AUC (Area Under the ROC Curve) </a:t>
+            </a:r>
+            <a:r>
+              <a:rPr lang="en-US" dirty="0" err="1"/>
+              <a:t>mera</a:t>
+            </a:r>
+            <a:r>
+              <a:rPr lang="en-US" dirty="0"/>
+              <a:t>. AUC meri </a:t>
+            </a:r>
+            <a:r>
+              <a:rPr lang="en-US" dirty="0" err="1"/>
+              <a:t>celokupno</a:t>
+            </a:r>
+            <a:r>
+              <a:rPr lang="en-US" dirty="0"/>
+              <a:t> </a:t>
+            </a:r>
+            <a:r>
+              <a:rPr lang="en-US" dirty="0" err="1"/>
+              <a:t>dvodimenzionalno</a:t>
+            </a:r>
+            <a:r>
+              <a:rPr lang="en-US" dirty="0"/>
+              <a:t> </a:t>
+            </a:r>
+            <a:r>
+              <a:rPr lang="en-US" dirty="0" err="1"/>
+              <a:t>područje</a:t>
+            </a:r>
+            <a:r>
+              <a:rPr lang="en-US" dirty="0"/>
+              <a:t> </a:t>
+            </a:r>
+            <a:r>
+              <a:rPr lang="en-US" dirty="0" err="1"/>
+              <a:t>ispod</a:t>
+            </a:r>
+            <a:r>
+              <a:rPr lang="en-US" dirty="0"/>
+              <a:t> </a:t>
+            </a:r>
+            <a:r>
+              <a:rPr lang="en-US" dirty="0" err="1"/>
+              <a:t>cele</a:t>
+            </a:r>
+            <a:r>
+              <a:rPr lang="en-US" dirty="0"/>
+              <a:t> ROC </a:t>
+            </a:r>
+            <a:r>
+              <a:rPr lang="en-US" dirty="0" err="1"/>
+              <a:t>krive</a:t>
+            </a:r>
+            <a:r>
+              <a:rPr lang="en-US" dirty="0"/>
+              <a:t> od (0,0) do (1,1).</a:t>
+            </a:r>
+            <a:r>
+              <a:rPr lang="sr-Latn-RS" dirty="0"/>
+              <a:t> . Model čija su predviđanja 100% pogrešna ima AUC od 0,0. Onaj model čija su predviđanja 100% tačna ima AUC 1,0. </a:t>
+            </a:r>
+            <a:endParaRPr lang="en-US" dirty="0"/>
           </a:p>
         </p:txBody>
       </p:sp>
       <p:pic>
         <p:nvPicPr>
-          <p:cNvPr id="13" name="Picture 12">
+          <p:cNvPr id="5" name="Picture 4">
             <a:extLst>
               <a:ext uri="{FF2B5EF4-FFF2-40B4-BE49-F238E27FC236}">
-                <a16:creationId xmlns:a16="http://schemas.microsoft.com/office/drawing/2014/main" id="{869FB91E-BACA-4DEC-98DF-9BBDF0B7F0FB}"/>
+                <a16:creationId xmlns:a16="http://schemas.microsoft.com/office/drawing/2014/main" id="{56E194F3-293C-4F44-A83E-E01217BF0A8D}"/>
               </a:ext>
             </a:extLst>
           </p:cNvPr>
-          <p:cNvPicPr/>
+          <p:cNvPicPr>
+            <a:picLocks noChangeAspect="1"/>
+          </p:cNvPicPr>
           <p:nvPr/>
         </p:nvPicPr>
         <p:blipFill>
-          <a:blip r:embed="rId3">
-            <a:extLst>
-              <a:ext uri="{28A0092B-C50C-407E-A947-70E740481C1C}">
-                <a14:useLocalDpi xmlns:a14="http://schemas.microsoft.com/office/drawing/2010/main" val="0"/>
-              </a:ext>
-            </a:extLst>
-          </a:blip>
+          <a:blip r:embed="rId3"/>
           <a:stretch>
             <a:fillRect/>
           </a:stretch>
         </p:blipFill>
         <p:spPr>
           <a:xfrm>
-            <a:off x="0" y="977688"/>
-            <a:ext cx="4433777" cy="4165812"/>
-          </a:xfrm>
-          <a:prstGeom prst="rect">
-            <a:avLst/>
-          </a:prstGeom>
-        </p:spPr>
-      </p:pic>
-      <p:pic>
-        <p:nvPicPr>
-          <p:cNvPr id="14" name="Picture 13">
-            <a:extLst>
-              <a:ext uri="{FF2B5EF4-FFF2-40B4-BE49-F238E27FC236}">
-                <a16:creationId xmlns:a16="http://schemas.microsoft.com/office/drawing/2014/main" id="{D6046295-82CE-474E-B3F4-35ECC800BC3B}"/>
-              </a:ext>
-            </a:extLst>
-          </p:cNvPr>
-          <p:cNvPicPr/>
-          <p:nvPr/>
-        </p:nvPicPr>
-        <p:blipFill>
-          <a:blip r:embed="rId4">
-            <a:extLst>
-              <a:ext uri="{28A0092B-C50C-407E-A947-70E740481C1C}">
-                <a14:useLocalDpi xmlns:a14="http://schemas.microsoft.com/office/drawing/2010/main" val="0"/>
-              </a:ext>
-            </a:extLst>
-          </a:blip>
-          <a:stretch>
-            <a:fillRect/>
-          </a:stretch>
-        </p:blipFill>
-        <p:spPr>
-          <a:xfrm>
-            <a:off x="4433778" y="977688"/>
-            <a:ext cx="4710222" cy="4165812"/>
+            <a:off x="361507" y="1814015"/>
+            <a:ext cx="5486400" cy="1295400"/>
           </a:xfrm>
           <a:prstGeom prst="rect">
             <a:avLst/>
@@ -7160,10 +7549,10 @@
       </p:pic>
       <p:cxnSp>
         <p:nvCxnSpPr>
-          <p:cNvPr id="12" name="Straight Connector 11">
+          <p:cNvPr id="7" name="Straight Arrow Connector 6">
             <a:extLst>
               <a:ext uri="{FF2B5EF4-FFF2-40B4-BE49-F238E27FC236}">
-                <a16:creationId xmlns:a16="http://schemas.microsoft.com/office/drawing/2014/main" id="{67A471BB-9D4F-4980-A244-09EA9465E846}"/>
+                <a16:creationId xmlns:a16="http://schemas.microsoft.com/office/drawing/2014/main" id="{1540AA32-2E01-4E67-B3A2-59C33BC93EC4}"/>
               </a:ext>
             </a:extLst>
           </p:cNvPr>
@@ -7173,17 +7562,18 @@
           <p:nvPr/>
         </p:nvCxnSpPr>
         <p:spPr>
-          <a:xfrm>
-            <a:off x="4433777" y="977688"/>
-            <a:ext cx="0" cy="4165812"/>
-          </a:xfrm>
-          <a:prstGeom prst="line">
+          <a:xfrm flipH="1">
+            <a:off x="3296094" y="2658140"/>
+            <a:ext cx="2764464" cy="0"/>
+          </a:xfrm>
+          <a:prstGeom prst="straightConnector1">
             <a:avLst/>
           </a:prstGeom>
           <a:ln>
             <a:solidFill>
               <a:srgbClr val="FF0000"/>
             </a:solidFill>
+            <a:tailEnd type="triangle"/>
           </a:ln>
         </p:spPr>
         <p:style>
@@ -7201,10 +7591,212 @@
           </a:fontRef>
         </p:style>
       </p:cxnSp>
+      <p:sp>
+        <p:nvSpPr>
+          <p:cNvPr id="8" name="TextBox 7">
+            <a:extLst>
+              <a:ext uri="{FF2B5EF4-FFF2-40B4-BE49-F238E27FC236}">
+                <a16:creationId xmlns:a16="http://schemas.microsoft.com/office/drawing/2014/main" id="{5D8C1C50-AE8A-401A-B67D-3327E42D1E47}"/>
+              </a:ext>
+            </a:extLst>
+          </p:cNvPr>
+          <p:cNvSpPr txBox="1"/>
+          <p:nvPr/>
+        </p:nvSpPr>
+        <p:spPr>
+          <a:xfrm>
+            <a:off x="6071191" y="2288808"/>
+            <a:ext cx="2169042" cy="738664"/>
+          </a:xfrm>
+          <a:prstGeom prst="rect">
+            <a:avLst/>
+          </a:prstGeom>
+          <a:noFill/>
+        </p:spPr>
+        <p:txBody>
+          <a:bodyPr wrap="square" rtlCol="0">
+            <a:spAutoFit/>
+          </a:bodyPr>
+          <a:lstStyle/>
+          <a:p>
+            <a:r>
+              <a:rPr lang="en-US" dirty="0">
+                <a:solidFill>
+                  <a:srgbClr val="FF0000"/>
+                </a:solidFill>
+              </a:rPr>
+              <a:t>Kori</a:t>
+            </a:r>
+            <a:r>
+              <a:rPr lang="sr-Latn-RS" dirty="0">
+                <a:solidFill>
+                  <a:srgbClr val="FF0000"/>
+                </a:solidFill>
+              </a:rPr>
+              <a:t>ćena je </a:t>
+            </a:r>
+            <a:r>
+              <a:rPr lang="sr-Latn-RS" i="1" dirty="0">
+                <a:solidFill>
+                  <a:srgbClr val="FF0000"/>
+                </a:solidFill>
+              </a:rPr>
+              <a:t>roc_auc_score </a:t>
+            </a:r>
+            <a:r>
+              <a:rPr lang="sr-Latn-RS" dirty="0">
+                <a:solidFill>
+                  <a:srgbClr val="FF0000"/>
+                </a:solidFill>
+              </a:rPr>
+              <a:t>funkcija iz </a:t>
+            </a:r>
+            <a:r>
+              <a:rPr lang="sr-Latn-RS" i="1" dirty="0">
+                <a:solidFill>
+                  <a:srgbClr val="FF0000"/>
+                </a:solidFill>
+              </a:rPr>
+              <a:t>sklearn</a:t>
+            </a:r>
+            <a:r>
+              <a:rPr lang="sr-Latn-RS" dirty="0">
+                <a:solidFill>
+                  <a:srgbClr val="FF0000"/>
+                </a:solidFill>
+              </a:rPr>
+              <a:t> biblioteke</a:t>
+            </a:r>
+            <a:endParaRPr lang="en-US" dirty="0">
+              <a:solidFill>
+                <a:srgbClr val="FF0000"/>
+              </a:solidFill>
+            </a:endParaRPr>
+          </a:p>
+        </p:txBody>
+      </p:sp>
+      <p:pic>
+        <p:nvPicPr>
+          <p:cNvPr id="15" name="Picture 14">
+            <a:extLst>
+              <a:ext uri="{FF2B5EF4-FFF2-40B4-BE49-F238E27FC236}">
+                <a16:creationId xmlns:a16="http://schemas.microsoft.com/office/drawing/2014/main" id="{BEC3B0C8-86CE-4627-A0C3-C4ACBBA08ED6}"/>
+              </a:ext>
+            </a:extLst>
+          </p:cNvPr>
+          <p:cNvPicPr>
+            <a:picLocks noChangeAspect="1"/>
+          </p:cNvPicPr>
+          <p:nvPr/>
+        </p:nvPicPr>
+        <p:blipFill>
+          <a:blip r:embed="rId4"/>
+          <a:stretch>
+            <a:fillRect/>
+          </a:stretch>
+        </p:blipFill>
+        <p:spPr>
+          <a:xfrm>
+            <a:off x="271906" y="3307003"/>
+            <a:ext cx="6048375" cy="390525"/>
+          </a:xfrm>
+          <a:prstGeom prst="rect">
+            <a:avLst/>
+          </a:prstGeom>
+        </p:spPr>
+      </p:pic>
+      <p:cxnSp>
+        <p:nvCxnSpPr>
+          <p:cNvPr id="17" name="Straight Arrow Connector 16">
+            <a:extLst>
+              <a:ext uri="{FF2B5EF4-FFF2-40B4-BE49-F238E27FC236}">
+                <a16:creationId xmlns:a16="http://schemas.microsoft.com/office/drawing/2014/main" id="{003590DD-2E1B-403E-9EEC-E63B01CEB778}"/>
+              </a:ext>
+            </a:extLst>
+          </p:cNvPr>
+          <p:cNvCxnSpPr>
+            <a:cxnSpLocks/>
+          </p:cNvCxnSpPr>
+          <p:nvPr/>
+        </p:nvCxnSpPr>
+        <p:spPr>
+          <a:xfrm flipH="1" flipV="1">
+            <a:off x="2488019" y="3827722"/>
+            <a:ext cx="893134" cy="375241"/>
+          </a:xfrm>
+          <a:prstGeom prst="straightConnector1">
+            <a:avLst/>
+          </a:prstGeom>
+          <a:ln>
+            <a:solidFill>
+              <a:srgbClr val="FF0000"/>
+            </a:solidFill>
+            <a:tailEnd type="triangle"/>
+          </a:ln>
+        </p:spPr>
+        <p:style>
+          <a:lnRef idx="1">
+            <a:schemeClr val="accent1"/>
+          </a:lnRef>
+          <a:fillRef idx="0">
+            <a:schemeClr val="accent1"/>
+          </a:fillRef>
+          <a:effectRef idx="0">
+            <a:schemeClr val="accent1"/>
+          </a:effectRef>
+          <a:fontRef idx="minor">
+            <a:schemeClr val="tx1"/>
+          </a:fontRef>
+        </p:style>
+      </p:cxnSp>
+      <p:sp>
+        <p:nvSpPr>
+          <p:cNvPr id="18" name="TextBox 17">
+            <a:extLst>
+              <a:ext uri="{FF2B5EF4-FFF2-40B4-BE49-F238E27FC236}">
+                <a16:creationId xmlns:a16="http://schemas.microsoft.com/office/drawing/2014/main" id="{6BB3C66A-FA84-42DF-BA40-C5065D20D38A}"/>
+              </a:ext>
+            </a:extLst>
+          </p:cNvPr>
+          <p:cNvSpPr txBox="1"/>
+          <p:nvPr/>
+        </p:nvSpPr>
+        <p:spPr>
+          <a:xfrm>
+            <a:off x="3381153" y="4125432"/>
+            <a:ext cx="2158410" cy="523220"/>
+          </a:xfrm>
+          <a:prstGeom prst="rect">
+            <a:avLst/>
+          </a:prstGeom>
+          <a:noFill/>
+        </p:spPr>
+        <p:txBody>
+          <a:bodyPr wrap="square" rtlCol="0">
+            <a:spAutoFit/>
+          </a:bodyPr>
+          <a:lstStyle/>
+          <a:p>
+            <a:r>
+              <a:rPr lang="sr-Latn-RS" dirty="0">
+                <a:solidFill>
+                  <a:srgbClr val="FF0000"/>
+                </a:solidFill>
+              </a:rPr>
+              <a:t>Računjanje procenta poboljšanja klasifikatora</a:t>
+            </a:r>
+            <a:endParaRPr lang="en-US" dirty="0">
+              <a:solidFill>
+                <a:srgbClr val="FF0000"/>
+              </a:solidFill>
+            </a:endParaRPr>
+          </a:p>
+        </p:txBody>
+      </p:sp>
     </p:spTree>
     <p:extLst>
       <p:ext uri="{BB962C8B-B14F-4D97-AF65-F5344CB8AC3E}">
-        <p14:creationId xmlns:p14="http://schemas.microsoft.com/office/powerpoint/2010/main" val="1261045065"/>
+        <p14:creationId xmlns:p14="http://schemas.microsoft.com/office/powerpoint/2010/main" val="2358875063"/>
       </p:ext>
     </p:extLst>
   </p:cSld>
@@ -7267,168 +7859,22 @@
             </a:pPr>
             <a:r>
               <a:rPr lang="sr-Latn-RS" dirty="0"/>
-              <a:t>Evaluacija algoritama</a:t>
+              <a:t>Preprocesiranje – Redukcija dimanzionalnosti</a:t>
+            </a:r>
+            <a:r>
+              <a:rPr lang="en-US" dirty="0"/>
+              <a:t> k=16</a:t>
             </a:r>
             <a:endParaRPr dirty="0"/>
           </a:p>
         </p:txBody>
       </p:sp>
-      <p:sp>
-        <p:nvSpPr>
-          <p:cNvPr id="3" name="TextBox 2">
+      <p:cxnSp>
+        <p:nvCxnSpPr>
+          <p:cNvPr id="4" name="Straight Arrow Connector 3">
             <a:extLst>
               <a:ext uri="{FF2B5EF4-FFF2-40B4-BE49-F238E27FC236}">
-                <a16:creationId xmlns:a16="http://schemas.microsoft.com/office/drawing/2014/main" id="{32721BFC-39CB-4C83-8641-4F5A619B1D10}"/>
-              </a:ext>
-            </a:extLst>
-          </p:cNvPr>
-          <p:cNvSpPr txBox="1"/>
-          <p:nvPr/>
-        </p:nvSpPr>
-        <p:spPr>
-          <a:xfrm>
-            <a:off x="361507" y="808074"/>
-            <a:ext cx="7878726" cy="954107"/>
-          </a:xfrm>
-          <a:prstGeom prst="rect">
-            <a:avLst/>
-          </a:prstGeom>
-          <a:noFill/>
-        </p:spPr>
-        <p:txBody>
-          <a:bodyPr wrap="square" rtlCol="0">
-            <a:spAutoFit/>
-          </a:bodyPr>
-          <a:lstStyle/>
-          <a:p>
-            <a:r>
-              <a:rPr lang="en-US" dirty="0"/>
-              <a:t>Za </a:t>
-            </a:r>
-            <a:r>
-              <a:rPr lang="en-US" dirty="0" err="1"/>
-              <a:t>evaluaciju</a:t>
-            </a:r>
-            <a:r>
-              <a:rPr lang="en-US" dirty="0"/>
-              <a:t> </a:t>
-            </a:r>
-            <a:r>
-              <a:rPr lang="en-US" dirty="0" err="1"/>
-              <a:t>algoritama</a:t>
-            </a:r>
-            <a:r>
-              <a:rPr lang="en-US" dirty="0"/>
-              <a:t> je </a:t>
-            </a:r>
-            <a:r>
-              <a:rPr lang="en-US" dirty="0" err="1"/>
-              <a:t>korišćena</a:t>
-            </a:r>
-            <a:r>
-              <a:rPr lang="en-US" dirty="0"/>
-              <a:t> AUC (Area Under the ROC Curve) </a:t>
-            </a:r>
-            <a:r>
-              <a:rPr lang="en-US" dirty="0" err="1"/>
-              <a:t>mera</a:t>
-            </a:r>
-            <a:r>
-              <a:rPr lang="en-US" dirty="0"/>
-              <a:t>. AUC meri </a:t>
-            </a:r>
-            <a:r>
-              <a:rPr lang="en-US" dirty="0" err="1"/>
-              <a:t>celokupno</a:t>
-            </a:r>
-            <a:r>
-              <a:rPr lang="en-US" dirty="0"/>
-              <a:t> </a:t>
-            </a:r>
-            <a:r>
-              <a:rPr lang="en-US" dirty="0" err="1"/>
-              <a:t>dvodimenzionalno</a:t>
-            </a:r>
-            <a:r>
-              <a:rPr lang="en-US" dirty="0"/>
-              <a:t> </a:t>
-            </a:r>
-            <a:r>
-              <a:rPr lang="en-US" dirty="0" err="1"/>
-              <a:t>područje</a:t>
-            </a:r>
-            <a:r>
-              <a:rPr lang="en-US" dirty="0"/>
-              <a:t> </a:t>
-            </a:r>
-            <a:r>
-              <a:rPr lang="en-US" dirty="0" err="1"/>
-              <a:t>ispod</a:t>
-            </a:r>
-            <a:r>
-              <a:rPr lang="en-US" dirty="0"/>
-              <a:t> </a:t>
-            </a:r>
-            <a:r>
-              <a:rPr lang="en-US" dirty="0" err="1"/>
-              <a:t>cele</a:t>
-            </a:r>
-            <a:r>
-              <a:rPr lang="en-US" dirty="0"/>
-              <a:t> ROC </a:t>
-            </a:r>
-            <a:r>
-              <a:rPr lang="en-US" dirty="0" err="1"/>
-              <a:t>krive</a:t>
-            </a:r>
-            <a:r>
-              <a:rPr lang="en-US" dirty="0"/>
-              <a:t> od (0,0) do (1,1).</a:t>
-            </a:r>
-            <a:r>
-              <a:rPr lang="sr-Latn-RS" dirty="0"/>
-              <a:t> . Model čija su predviđanja 100% pogrešna ima AUC od 0,0. Onaj model čija su predviđanja 100% tačna ima AUC 1,0. </a:t>
-            </a:r>
-            <a:endParaRPr lang="en-US" dirty="0"/>
-          </a:p>
-        </p:txBody>
-      </p:sp>
-      <p:pic>
-        <p:nvPicPr>
-          <p:cNvPr id="5" name="Picture 4">
-            <a:extLst>
-              <a:ext uri="{FF2B5EF4-FFF2-40B4-BE49-F238E27FC236}">
-                <a16:creationId xmlns:a16="http://schemas.microsoft.com/office/drawing/2014/main" id="{56E194F3-293C-4F44-A83E-E01217BF0A8D}"/>
-              </a:ext>
-            </a:extLst>
-          </p:cNvPr>
-          <p:cNvPicPr>
-            <a:picLocks noChangeAspect="1"/>
-          </p:cNvPicPr>
-          <p:nvPr/>
-        </p:nvPicPr>
-        <p:blipFill>
-          <a:blip r:embed="rId3"/>
-          <a:stretch>
-            <a:fillRect/>
-          </a:stretch>
-        </p:blipFill>
-        <p:spPr>
-          <a:xfrm>
-            <a:off x="361507" y="1814015"/>
-            <a:ext cx="5486400" cy="1295400"/>
-          </a:xfrm>
-          <a:prstGeom prst="rect">
-            <a:avLst/>
-          </a:prstGeom>
-        </p:spPr>
-      </p:pic>
-      <p:cxnSp>
-        <p:nvCxnSpPr>
-          <p:cNvPr id="7" name="Straight Arrow Connector 6">
-            <a:extLst>
-              <a:ext uri="{FF2B5EF4-FFF2-40B4-BE49-F238E27FC236}">
-                <a16:creationId xmlns:a16="http://schemas.microsoft.com/office/drawing/2014/main" id="{1540AA32-2E01-4E67-B3A2-59C33BC93EC4}"/>
+                <a16:creationId xmlns:a16="http://schemas.microsoft.com/office/drawing/2014/main" id="{68AF3F0C-D857-47F6-A498-82D06242CE57}"/>
               </a:ext>
             </a:extLst>
           </p:cNvPr>
@@ -7439,8 +7885,53 @@
         </p:nvCxnSpPr>
         <p:spPr>
           <a:xfrm flipH="1">
-            <a:off x="3296094" y="2658140"/>
-            <a:ext cx="2764464" cy="0"/>
+            <a:off x="5071730" y="1759088"/>
+            <a:ext cx="605170" cy="812662"/>
+          </a:xfrm>
+          <a:prstGeom prst="straightConnector1">
+            <a:avLst/>
+          </a:prstGeom>
+          <a:ln>
+            <a:solidFill>
+              <a:srgbClr val="FF0000"/>
+            </a:solidFill>
+            <a:tailEnd type="triangle"/>
+          </a:ln>
+        </p:spPr>
+        <p:style>
+          <a:lnRef idx="1">
+            <a:schemeClr val="accent1"/>
+          </a:lnRef>
+          <a:fillRef idx="0">
+            <a:schemeClr val="accent1"/>
+          </a:fillRef>
+          <a:effectRef idx="0">
+            <a:schemeClr val="accent1"/>
+          </a:effectRef>
+          <a:fontRef idx="minor">
+            <a:schemeClr val="tx1"/>
+          </a:fontRef>
+        </p:style>
+      </p:cxnSp>
+      <p:cxnSp>
+        <p:nvCxnSpPr>
+          <p:cNvPr id="16" name="Straight Arrow Connector 15">
+            <a:extLst>
+              <a:ext uri="{FF2B5EF4-FFF2-40B4-BE49-F238E27FC236}">
+                <a16:creationId xmlns:a16="http://schemas.microsoft.com/office/drawing/2014/main" id="{E1B69A60-D232-4186-9BDF-59DF5F15837D}"/>
+              </a:ext>
+            </a:extLst>
+          </p:cNvPr>
+          <p:cNvCxnSpPr>
+            <a:cxnSpLocks/>
+            <a:stCxn id="17" idx="1"/>
+          </p:cNvCxnSpPr>
+          <p:nvPr/>
+        </p:nvCxnSpPr>
+        <p:spPr>
+          <a:xfrm flipH="1">
+            <a:off x="3769686" y="1525431"/>
+            <a:ext cx="1604629" cy="36911"/>
           </a:xfrm>
           <a:prstGeom prst="straightConnector1">
             <a:avLst/>
@@ -7469,10 +7960,10 @@
       </p:cxnSp>
       <p:sp>
         <p:nvSpPr>
-          <p:cNvPr id="8" name="TextBox 7">
+          <p:cNvPr id="17" name="TextBox 16">
             <a:extLst>
               <a:ext uri="{FF2B5EF4-FFF2-40B4-BE49-F238E27FC236}">
-                <a16:creationId xmlns:a16="http://schemas.microsoft.com/office/drawing/2014/main" id="{5D8C1C50-AE8A-401A-B67D-3327E42D1E47}"/>
+                <a16:creationId xmlns:a16="http://schemas.microsoft.com/office/drawing/2014/main" id="{D9D29EC4-52C0-41DD-99AF-CE6946B349C2}"/>
               </a:ext>
             </a:extLst>
           </p:cNvPr>
@@ -7481,8 +7972,8 @@
         </p:nvSpPr>
         <p:spPr>
           <a:xfrm>
-            <a:off x="6071191" y="2288808"/>
-            <a:ext cx="2169042" cy="738664"/>
+            <a:off x="5374315" y="1371542"/>
+            <a:ext cx="2615610" cy="307777"/>
           </a:xfrm>
           <a:prstGeom prst="rect">
             <a:avLst/>
@@ -7496,52 +7987,12 @@
           <a:lstStyle/>
           <a:p>
             <a:r>
-              <a:rPr lang="en-US" dirty="0">
-                <a:solidFill>
-                  <a:srgbClr val="FF0000"/>
-                </a:solidFill>
-              </a:rPr>
-              <a:t>Kori</a:t>
-            </a:r>
-            <a:r>
               <a:rPr lang="sr-Latn-RS" dirty="0">
                 <a:solidFill>
                   <a:srgbClr val="FF0000"/>
                 </a:solidFill>
               </a:rPr>
-              <a:t>ćena je </a:t>
-            </a:r>
-            <a:r>
-              <a:rPr lang="sr-Latn-RS" i="1" dirty="0">
-                <a:solidFill>
-                  <a:srgbClr val="FF0000"/>
-                </a:solidFill>
-              </a:rPr>
-              <a:t>roc_auc_score </a:t>
-            </a:r>
-            <a:r>
-              <a:rPr lang="sr-Latn-RS" dirty="0">
-                <a:solidFill>
-                  <a:srgbClr val="FF0000"/>
-                </a:solidFill>
-              </a:rPr>
-              <a:t>funkcija iz </a:t>
-            </a:r>
-            <a:r>
-              <a:rPr lang="sr-Latn-RS" i="1" dirty="0">
-                <a:solidFill>
-                  <a:srgbClr val="FF0000"/>
-                </a:solidFill>
-              </a:rPr>
-              <a:t>sklearn</a:t>
-            </a:r>
-            <a:r>
-              <a:rPr lang="sr-Latn-RS" dirty="0">
-                <a:solidFill>
-                  <a:srgbClr val="FF0000"/>
-                </a:solidFill>
-              </a:rPr>
-              <a:t> biblioteke</a:t>
+              <a:t>Korišćenje PCA metode</a:t>
             </a:r>
             <a:endParaRPr lang="en-US" dirty="0">
               <a:solidFill>
@@ -7553,10 +8004,40 @@
       </p:sp>
       <p:pic>
         <p:nvPicPr>
-          <p:cNvPr id="15" name="Picture 14">
+          <p:cNvPr id="3" name="Picture 2">
             <a:extLst>
               <a:ext uri="{FF2B5EF4-FFF2-40B4-BE49-F238E27FC236}">
-                <a16:creationId xmlns:a16="http://schemas.microsoft.com/office/drawing/2014/main" id="{BEC3B0C8-86CE-4627-A0C3-C4ACBBA08ED6}"/>
+                <a16:creationId xmlns:a16="http://schemas.microsoft.com/office/drawing/2014/main" id="{E5FD8F0E-50AB-4BC7-909F-3A53F8B1771C}"/>
+              </a:ext>
+            </a:extLst>
+          </p:cNvPr>
+          <p:cNvPicPr>
+            <a:picLocks noChangeAspect="1"/>
+          </p:cNvPicPr>
+          <p:nvPr/>
+        </p:nvPicPr>
+        <p:blipFill>
+          <a:blip r:embed="rId3"/>
+          <a:stretch>
+            <a:fillRect/>
+          </a:stretch>
+        </p:blipFill>
+        <p:spPr>
+          <a:xfrm>
+            <a:off x="21265" y="1094701"/>
+            <a:ext cx="3646909" cy="812663"/>
+          </a:xfrm>
+          <a:prstGeom prst="rect">
+            <a:avLst/>
+          </a:prstGeom>
+        </p:spPr>
+      </p:pic>
+      <p:pic>
+        <p:nvPicPr>
+          <p:cNvPr id="6" name="Picture 5">
+            <a:extLst>
+              <a:ext uri="{FF2B5EF4-FFF2-40B4-BE49-F238E27FC236}">
+                <a16:creationId xmlns:a16="http://schemas.microsoft.com/office/drawing/2014/main" id="{88BA20AC-707A-440D-978E-F65D934DEAF2}"/>
               </a:ext>
             </a:extLst>
           </p:cNvPr>
@@ -7573,20 +8054,128 @@
         </p:blipFill>
         <p:spPr>
           <a:xfrm>
-            <a:off x="271906" y="3307003"/>
-            <a:ext cx="6048375" cy="390525"/>
+            <a:off x="21265" y="2608996"/>
+            <a:ext cx="9144000" cy="1485148"/>
           </a:xfrm>
           <a:prstGeom prst="rect">
             <a:avLst/>
           </a:prstGeom>
         </p:spPr>
       </p:pic>
+    </p:spTree>
+    <p:extLst>
+      <p:ext uri="{BB962C8B-B14F-4D97-AF65-F5344CB8AC3E}">
+        <p14:creationId xmlns:p14="http://schemas.microsoft.com/office/powerpoint/2010/main" val="2715608924"/>
+      </p:ext>
+    </p:extLst>
+  </p:cSld>
+  <p:clrMapOvr>
+    <a:masterClrMapping/>
+  </p:clrMapOvr>
+</p:sld>
+</file>
+
+<file path=ppt/slides/slide14.xml><?xml version="1.0" encoding="utf-8"?>
+<p:sld xmlns:a="http://schemas.openxmlformats.org/drawingml/2006/main" xmlns:r="http://schemas.openxmlformats.org/officeDocument/2006/relationships" xmlns:p="http://schemas.openxmlformats.org/presentationml/2006/main">
+  <p:cSld>
+    <p:spTree>
+      <p:nvGrpSpPr>
+        <p:cNvPr id="1" name="Shape 157"/>
+        <p:cNvGrpSpPr/>
+        <p:nvPr/>
+      </p:nvGrpSpPr>
+      <p:grpSpPr>
+        <a:xfrm>
+          <a:off x="0" y="0"/>
+          <a:ext cx="0" cy="0"/>
+          <a:chOff x="0" y="0"/>
+          <a:chExt cx="0" cy="0"/>
+        </a:xfrm>
+      </p:grpSpPr>
+      <p:pic>
+        <p:nvPicPr>
+          <p:cNvPr id="19" name="Picture 18">
+            <a:extLst>
+              <a:ext uri="{FF2B5EF4-FFF2-40B4-BE49-F238E27FC236}">
+                <a16:creationId xmlns:a16="http://schemas.microsoft.com/office/drawing/2014/main" id="{1F3CE8A6-3E64-4CE1-939D-099F1E710F25}"/>
+              </a:ext>
+            </a:extLst>
+          </p:cNvPr>
+          <p:cNvPicPr/>
+          <p:nvPr/>
+        </p:nvPicPr>
+        <p:blipFill>
+          <a:blip r:embed="rId3"/>
+          <a:stretch>
+            <a:fillRect/>
+          </a:stretch>
+        </p:blipFill>
+        <p:spPr>
+          <a:xfrm>
+            <a:off x="116958" y="1086957"/>
+            <a:ext cx="5295900" cy="1447800"/>
+          </a:xfrm>
+          <a:prstGeom prst="rect">
+            <a:avLst/>
+          </a:prstGeom>
+          <a:noFill/>
+          <a:ln>
+            <a:noFill/>
+          </a:ln>
+        </p:spPr>
+      </p:pic>
+      <p:sp>
+        <p:nvSpPr>
+          <p:cNvPr id="159" name="Google Shape;159;p34"/>
+          <p:cNvSpPr txBox="1">
+            <a:spLocks noGrp="1"/>
+          </p:cNvSpPr>
+          <p:nvPr>
+            <p:ph type="ctrTitle"/>
+          </p:nvPr>
+        </p:nvSpPr>
+        <p:spPr>
+          <a:xfrm>
+            <a:off x="574159" y="56640"/>
+            <a:ext cx="7804298" cy="613271"/>
+          </a:xfrm>
+          <a:prstGeom prst="rect">
+            <a:avLst/>
+          </a:prstGeom>
+        </p:spPr>
+        <p:txBody>
+          <a:bodyPr spcFirstLastPara="1" wrap="square" lIns="91425" tIns="91425" rIns="91425" bIns="91425" anchor="t" anchorCtr="0">
+            <a:noAutofit/>
+          </a:bodyPr>
+          <a:lstStyle/>
+          <a:p>
+            <a:pPr marL="0" lvl="0" indent="0" algn="ctr" rtl="0">
+              <a:spcBef>
+                <a:spcPts val="0"/>
+              </a:spcBef>
+              <a:spcAft>
+                <a:spcPts val="0"/>
+              </a:spcAft>
+              <a:buNone/>
+            </a:pPr>
+            <a:r>
+              <a:rPr lang="sr-Latn-RS" dirty="0"/>
+              <a:t>Preprocesiranje – Redukcija dimanzionalnosti</a:t>
+            </a:r>
+            <a:r>
+              <a:rPr lang="en-US" dirty="0"/>
+              <a:t> k=16</a:t>
+            </a:r>
+            <a:endParaRPr dirty="0"/>
+          </a:p>
+        </p:txBody>
+      </p:sp>
       <p:cxnSp>
         <p:nvCxnSpPr>
-          <p:cNvPr id="17" name="Straight Arrow Connector 16">
+          <p:cNvPr id="4" name="Straight Arrow Connector 3">
             <a:extLst>
               <a:ext uri="{FF2B5EF4-FFF2-40B4-BE49-F238E27FC236}">
-                <a16:creationId xmlns:a16="http://schemas.microsoft.com/office/drawing/2014/main" id="{003590DD-2E1B-403E-9EEC-E63B01CEB778}"/>
+                <a16:creationId xmlns:a16="http://schemas.microsoft.com/office/drawing/2014/main" id="{68AF3F0C-D857-47F6-A498-82D06242CE57}"/>
               </a:ext>
             </a:extLst>
           </p:cNvPr>
@@ -7596,9 +8185,54 @@
           <p:nvPr/>
         </p:nvCxnSpPr>
         <p:spPr>
-          <a:xfrm flipH="1" flipV="1">
-            <a:off x="2488019" y="3827722"/>
-            <a:ext cx="893134" cy="375241"/>
+          <a:xfrm>
+            <a:off x="7421526" y="1180214"/>
+            <a:ext cx="0" cy="925033"/>
+          </a:xfrm>
+          <a:prstGeom prst="straightConnector1">
+            <a:avLst/>
+          </a:prstGeom>
+          <a:ln>
+            <a:solidFill>
+              <a:srgbClr val="FF0000"/>
+            </a:solidFill>
+            <a:tailEnd type="triangle"/>
+          </a:ln>
+        </p:spPr>
+        <p:style>
+          <a:lnRef idx="1">
+            <a:schemeClr val="accent1"/>
+          </a:lnRef>
+          <a:fillRef idx="0">
+            <a:schemeClr val="accent1"/>
+          </a:fillRef>
+          <a:effectRef idx="0">
+            <a:schemeClr val="accent1"/>
+          </a:effectRef>
+          <a:fontRef idx="minor">
+            <a:schemeClr val="tx1"/>
+          </a:fontRef>
+        </p:style>
+      </p:cxnSp>
+      <p:cxnSp>
+        <p:nvCxnSpPr>
+          <p:cNvPr id="16" name="Straight Arrow Connector 15">
+            <a:extLst>
+              <a:ext uri="{FF2B5EF4-FFF2-40B4-BE49-F238E27FC236}">
+                <a16:creationId xmlns:a16="http://schemas.microsoft.com/office/drawing/2014/main" id="{E1B69A60-D232-4186-9BDF-59DF5F15837D}"/>
+              </a:ext>
+            </a:extLst>
+          </p:cNvPr>
+          <p:cNvCxnSpPr>
+            <a:cxnSpLocks/>
+            <a:stCxn id="17" idx="1"/>
+          </p:cNvCxnSpPr>
+          <p:nvPr/>
+        </p:nvCxnSpPr>
+        <p:spPr>
+          <a:xfrm flipH="1">
+            <a:off x="5199321" y="1086957"/>
+            <a:ext cx="914400" cy="384631"/>
           </a:xfrm>
           <a:prstGeom prst="straightConnector1">
             <a:avLst/>
@@ -7627,10 +8261,10 @@
       </p:cxnSp>
       <p:sp>
         <p:nvSpPr>
-          <p:cNvPr id="18" name="TextBox 17">
+          <p:cNvPr id="17" name="TextBox 16">
             <a:extLst>
               <a:ext uri="{FF2B5EF4-FFF2-40B4-BE49-F238E27FC236}">
-                <a16:creationId xmlns:a16="http://schemas.microsoft.com/office/drawing/2014/main" id="{6BB3C66A-FA84-42DF-BA40-C5065D20D38A}"/>
+                <a16:creationId xmlns:a16="http://schemas.microsoft.com/office/drawing/2014/main" id="{D9D29EC4-52C0-41DD-99AF-CE6946B349C2}"/>
               </a:ext>
             </a:extLst>
           </p:cNvPr>
@@ -7639,8 +8273,8 @@
         </p:nvSpPr>
         <p:spPr>
           <a:xfrm>
-            <a:off x="3381153" y="4125432"/>
-            <a:ext cx="2158410" cy="523220"/>
+            <a:off x="6113721" y="825347"/>
+            <a:ext cx="2615610" cy="523220"/>
           </a:xfrm>
           <a:prstGeom prst="rect">
             <a:avLst/>
@@ -7659,7 +8293,7 @@
                   <a:srgbClr val="FF0000"/>
                 </a:solidFill>
               </a:rPr>
-              <a:t>Računjanje procenta poboljšanja klasifikatora</a:t>
+              <a:t>Selekcija K najrelevantnijih atributa</a:t>
             </a:r>
             <a:endParaRPr lang="en-US" dirty="0">
               <a:solidFill>
@@ -7669,10 +8303,42 @@
           </a:p>
         </p:txBody>
       </p:sp>
+      <p:pic>
+        <p:nvPicPr>
+          <p:cNvPr id="20" name="Picture 19">
+            <a:extLst>
+              <a:ext uri="{FF2B5EF4-FFF2-40B4-BE49-F238E27FC236}">
+                <a16:creationId xmlns:a16="http://schemas.microsoft.com/office/drawing/2014/main" id="{AD054E3F-D2A9-4531-BDEA-F125C3F1FA97}"/>
+              </a:ext>
+            </a:extLst>
+          </p:cNvPr>
+          <p:cNvPicPr/>
+          <p:nvPr/>
+        </p:nvPicPr>
+        <p:blipFill>
+          <a:blip r:embed="rId4"/>
+          <a:stretch>
+            <a:fillRect/>
+          </a:stretch>
+        </p:blipFill>
+        <p:spPr>
+          <a:xfrm>
+            <a:off x="4173279" y="2251998"/>
+            <a:ext cx="4648200" cy="2638425"/>
+          </a:xfrm>
+          <a:prstGeom prst="rect">
+            <a:avLst/>
+          </a:prstGeom>
+          <a:noFill/>
+          <a:ln>
+            <a:noFill/>
+          </a:ln>
+        </p:spPr>
+      </p:pic>
     </p:spTree>
     <p:extLst>
       <p:ext uri="{BB962C8B-B14F-4D97-AF65-F5344CB8AC3E}">
-        <p14:creationId xmlns:p14="http://schemas.microsoft.com/office/powerpoint/2010/main" val="2358875063"/>
+        <p14:creationId xmlns:p14="http://schemas.microsoft.com/office/powerpoint/2010/main" val="1137878366"/>
       </p:ext>
     </p:extLst>
   </p:cSld>
@@ -7682,7 +8348,840 @@
 </p:sld>
 </file>
 
-<file path=ppt/slides/slide14.xml><?xml version="1.0" encoding="utf-8"?>
+<file path=ppt/slides/slide15.xml><?xml version="1.0" encoding="utf-8"?>
+<p:sld xmlns:a="http://schemas.openxmlformats.org/drawingml/2006/main" xmlns:r="http://schemas.openxmlformats.org/officeDocument/2006/relationships" xmlns:p="http://schemas.openxmlformats.org/presentationml/2006/main">
+  <p:cSld>
+    <p:spTree>
+      <p:nvGrpSpPr>
+        <p:cNvPr id="1" name="Shape 157"/>
+        <p:cNvGrpSpPr/>
+        <p:nvPr/>
+      </p:nvGrpSpPr>
+      <p:grpSpPr>
+        <a:xfrm>
+          <a:off x="0" y="0"/>
+          <a:ext cx="0" cy="0"/>
+          <a:chOff x="0" y="0"/>
+          <a:chExt cx="0" cy="0"/>
+        </a:xfrm>
+      </p:grpSpPr>
+      <p:pic>
+        <p:nvPicPr>
+          <p:cNvPr id="9" name="Picture 8">
+            <a:extLst>
+              <a:ext uri="{FF2B5EF4-FFF2-40B4-BE49-F238E27FC236}">
+                <a16:creationId xmlns:a16="http://schemas.microsoft.com/office/drawing/2014/main" id="{184ADCE7-6386-4960-A6A2-0D212E9C7292}"/>
+              </a:ext>
+            </a:extLst>
+          </p:cNvPr>
+          <p:cNvPicPr/>
+          <p:nvPr/>
+        </p:nvPicPr>
+        <p:blipFill>
+          <a:blip r:embed="rId3"/>
+          <a:stretch>
+            <a:fillRect/>
+          </a:stretch>
+        </p:blipFill>
+        <p:spPr>
+          <a:xfrm>
+            <a:off x="4433771" y="977688"/>
+            <a:ext cx="4710229" cy="4165812"/>
+          </a:xfrm>
+          <a:prstGeom prst="rect">
+            <a:avLst/>
+          </a:prstGeom>
+        </p:spPr>
+      </p:pic>
+      <p:pic>
+        <p:nvPicPr>
+          <p:cNvPr id="8" name="Picture 7">
+            <a:extLst>
+              <a:ext uri="{FF2B5EF4-FFF2-40B4-BE49-F238E27FC236}">
+                <a16:creationId xmlns:a16="http://schemas.microsoft.com/office/drawing/2014/main" id="{4A7A39E8-1FA1-451D-B68A-E5CEEB61B720}"/>
+              </a:ext>
+            </a:extLst>
+          </p:cNvPr>
+          <p:cNvPicPr/>
+          <p:nvPr/>
+        </p:nvPicPr>
+        <p:blipFill>
+          <a:blip r:embed="rId4"/>
+          <a:stretch>
+            <a:fillRect/>
+          </a:stretch>
+        </p:blipFill>
+        <p:spPr>
+          <a:xfrm>
+            <a:off x="0" y="977688"/>
+            <a:ext cx="4433771" cy="4165812"/>
+          </a:xfrm>
+          <a:prstGeom prst="rect">
+            <a:avLst/>
+          </a:prstGeom>
+        </p:spPr>
+      </p:pic>
+      <p:sp>
+        <p:nvSpPr>
+          <p:cNvPr id="159" name="Google Shape;159;p34"/>
+          <p:cNvSpPr txBox="1">
+            <a:spLocks noGrp="1"/>
+          </p:cNvSpPr>
+          <p:nvPr>
+            <p:ph type="ctrTitle"/>
+          </p:nvPr>
+        </p:nvSpPr>
+        <p:spPr>
+          <a:xfrm>
+            <a:off x="574159" y="56640"/>
+            <a:ext cx="7804298" cy="613271"/>
+          </a:xfrm>
+          <a:prstGeom prst="rect">
+            <a:avLst/>
+          </a:prstGeom>
+        </p:spPr>
+        <p:txBody>
+          <a:bodyPr spcFirstLastPara="1" wrap="square" lIns="91425" tIns="91425" rIns="91425" bIns="91425" anchor="t" anchorCtr="0">
+            <a:noAutofit/>
+          </a:bodyPr>
+          <a:lstStyle/>
+          <a:p>
+            <a:pPr marL="0" lvl="0" indent="0" algn="ctr" rtl="0">
+              <a:spcBef>
+                <a:spcPts val="0"/>
+              </a:spcBef>
+              <a:spcAft>
+                <a:spcPts val="0"/>
+              </a:spcAft>
+              <a:buNone/>
+            </a:pPr>
+            <a:r>
+              <a:rPr lang="sr-Latn-RS" dirty="0"/>
+              <a:t>Komparativna analiza algoritama</a:t>
+            </a:r>
+            <a:r>
+              <a:rPr lang="en-US" dirty="0"/>
+              <a:t> k=16</a:t>
+            </a:r>
+            <a:r>
+              <a:rPr lang="sr-Latn-RS" dirty="0"/>
+              <a:t> </a:t>
+            </a:r>
+            <a:endParaRPr dirty="0"/>
+          </a:p>
+        </p:txBody>
+      </p:sp>
+      <p:sp>
+        <p:nvSpPr>
+          <p:cNvPr id="2" name="TextBox 1">
+            <a:extLst>
+              <a:ext uri="{FF2B5EF4-FFF2-40B4-BE49-F238E27FC236}">
+                <a16:creationId xmlns:a16="http://schemas.microsoft.com/office/drawing/2014/main" id="{2A0632BE-A4D3-40D7-A91F-4964B067A359}"/>
+              </a:ext>
+            </a:extLst>
+          </p:cNvPr>
+          <p:cNvSpPr txBox="1"/>
+          <p:nvPr/>
+        </p:nvSpPr>
+        <p:spPr>
+          <a:xfrm>
+            <a:off x="191386" y="669911"/>
+            <a:ext cx="3030279" cy="307777"/>
+          </a:xfrm>
+          <a:prstGeom prst="rect">
+            <a:avLst/>
+          </a:prstGeom>
+          <a:noFill/>
+        </p:spPr>
+        <p:txBody>
+          <a:bodyPr wrap="square" rtlCol="0">
+            <a:spAutoFit/>
+          </a:bodyPr>
+          <a:lstStyle/>
+          <a:p>
+            <a:r>
+              <a:rPr lang="sr-Latn-RS" dirty="0">
+                <a:solidFill>
+                  <a:srgbClr val="FF0000"/>
+                </a:solidFill>
+              </a:rPr>
+              <a:t>Selekcija K najrelevantnijih atributa</a:t>
+            </a:r>
+            <a:endParaRPr lang="en-US" dirty="0">
+              <a:solidFill>
+                <a:srgbClr val="FF0000"/>
+              </a:solidFill>
+            </a:endParaRPr>
+          </a:p>
+        </p:txBody>
+      </p:sp>
+      <p:sp>
+        <p:nvSpPr>
+          <p:cNvPr id="10" name="TextBox 9">
+            <a:extLst>
+              <a:ext uri="{FF2B5EF4-FFF2-40B4-BE49-F238E27FC236}">
+                <a16:creationId xmlns:a16="http://schemas.microsoft.com/office/drawing/2014/main" id="{6E880D56-6604-40F1-8180-804FC4A3EC7F}"/>
+              </a:ext>
+            </a:extLst>
+          </p:cNvPr>
+          <p:cNvSpPr txBox="1"/>
+          <p:nvPr/>
+        </p:nvSpPr>
+        <p:spPr>
+          <a:xfrm>
+            <a:off x="6645349" y="669911"/>
+            <a:ext cx="1222746" cy="307777"/>
+          </a:xfrm>
+          <a:prstGeom prst="rect">
+            <a:avLst/>
+          </a:prstGeom>
+          <a:noFill/>
+        </p:spPr>
+        <p:txBody>
+          <a:bodyPr wrap="square" rtlCol="0">
+            <a:spAutoFit/>
+          </a:bodyPr>
+          <a:lstStyle/>
+          <a:p>
+            <a:r>
+              <a:rPr lang="sr-Latn-RS" dirty="0">
+                <a:solidFill>
+                  <a:srgbClr val="FF0000"/>
+                </a:solidFill>
+              </a:rPr>
+              <a:t>PCA metoda</a:t>
+            </a:r>
+            <a:endParaRPr lang="en-US" dirty="0">
+              <a:solidFill>
+                <a:srgbClr val="FF0000"/>
+              </a:solidFill>
+            </a:endParaRPr>
+          </a:p>
+        </p:txBody>
+      </p:sp>
+      <p:cxnSp>
+        <p:nvCxnSpPr>
+          <p:cNvPr id="12" name="Straight Connector 11">
+            <a:extLst>
+              <a:ext uri="{FF2B5EF4-FFF2-40B4-BE49-F238E27FC236}">
+                <a16:creationId xmlns:a16="http://schemas.microsoft.com/office/drawing/2014/main" id="{67A471BB-9D4F-4980-A244-09EA9465E846}"/>
+              </a:ext>
+            </a:extLst>
+          </p:cNvPr>
+          <p:cNvCxnSpPr>
+            <a:cxnSpLocks/>
+          </p:cNvCxnSpPr>
+          <p:nvPr/>
+        </p:nvCxnSpPr>
+        <p:spPr>
+          <a:xfrm>
+            <a:off x="4433777" y="977688"/>
+            <a:ext cx="0" cy="4165812"/>
+          </a:xfrm>
+          <a:prstGeom prst="line">
+            <a:avLst/>
+          </a:prstGeom>
+          <a:ln>
+            <a:solidFill>
+              <a:srgbClr val="FF0000"/>
+            </a:solidFill>
+          </a:ln>
+        </p:spPr>
+        <p:style>
+          <a:lnRef idx="1">
+            <a:schemeClr val="accent1"/>
+          </a:lnRef>
+          <a:fillRef idx="0">
+            <a:schemeClr val="accent1"/>
+          </a:fillRef>
+          <a:effectRef idx="0">
+            <a:schemeClr val="accent1"/>
+          </a:effectRef>
+          <a:fontRef idx="minor">
+            <a:schemeClr val="tx1"/>
+          </a:fontRef>
+        </p:style>
+      </p:cxnSp>
+    </p:spTree>
+    <p:extLst>
+      <p:ext uri="{BB962C8B-B14F-4D97-AF65-F5344CB8AC3E}">
+        <p14:creationId xmlns:p14="http://schemas.microsoft.com/office/powerpoint/2010/main" val="653325614"/>
+      </p:ext>
+    </p:extLst>
+  </p:cSld>
+  <p:clrMapOvr>
+    <a:masterClrMapping/>
+  </p:clrMapOvr>
+</p:sld>
+</file>
+
+<file path=ppt/slides/slide16.xml><?xml version="1.0" encoding="utf-8"?>
+<p:sld xmlns:a="http://schemas.openxmlformats.org/drawingml/2006/main" xmlns:r="http://schemas.openxmlformats.org/officeDocument/2006/relationships" xmlns:p="http://schemas.openxmlformats.org/presentationml/2006/main">
+  <p:cSld>
+    <p:spTree>
+      <p:nvGrpSpPr>
+        <p:cNvPr id="1" name="Shape 157"/>
+        <p:cNvGrpSpPr/>
+        <p:nvPr/>
+      </p:nvGrpSpPr>
+      <p:grpSpPr>
+        <a:xfrm>
+          <a:off x="0" y="0"/>
+          <a:ext cx="0" cy="0"/>
+          <a:chOff x="0" y="0"/>
+          <a:chExt cx="0" cy="0"/>
+        </a:xfrm>
+      </p:grpSpPr>
+      <p:pic>
+        <p:nvPicPr>
+          <p:cNvPr id="13" name="Picture 12">
+            <a:extLst>
+              <a:ext uri="{FF2B5EF4-FFF2-40B4-BE49-F238E27FC236}">
+                <a16:creationId xmlns:a16="http://schemas.microsoft.com/office/drawing/2014/main" id="{E007516D-6D41-4BC1-A286-9BD320BDBC8C}"/>
+              </a:ext>
+            </a:extLst>
+          </p:cNvPr>
+          <p:cNvPicPr/>
+          <p:nvPr/>
+        </p:nvPicPr>
+        <p:blipFill>
+          <a:blip r:embed="rId3"/>
+          <a:stretch>
+            <a:fillRect/>
+          </a:stretch>
+        </p:blipFill>
+        <p:spPr>
+          <a:xfrm>
+            <a:off x="4433771" y="977688"/>
+            <a:ext cx="4710228" cy="4165812"/>
+          </a:xfrm>
+          <a:prstGeom prst="rect">
+            <a:avLst/>
+          </a:prstGeom>
+        </p:spPr>
+      </p:pic>
+      <p:pic>
+        <p:nvPicPr>
+          <p:cNvPr id="11" name="Picture 10">
+            <a:extLst>
+              <a:ext uri="{FF2B5EF4-FFF2-40B4-BE49-F238E27FC236}">
+                <a16:creationId xmlns:a16="http://schemas.microsoft.com/office/drawing/2014/main" id="{D1EE0AF2-2B57-476A-AF36-7C365A7F7748}"/>
+              </a:ext>
+            </a:extLst>
+          </p:cNvPr>
+          <p:cNvPicPr/>
+          <p:nvPr/>
+        </p:nvPicPr>
+        <p:blipFill>
+          <a:blip r:embed="rId4"/>
+          <a:stretch>
+            <a:fillRect/>
+          </a:stretch>
+        </p:blipFill>
+        <p:spPr>
+          <a:xfrm>
+            <a:off x="1" y="977688"/>
+            <a:ext cx="4433770" cy="4165812"/>
+          </a:xfrm>
+          <a:prstGeom prst="rect">
+            <a:avLst/>
+          </a:prstGeom>
+        </p:spPr>
+      </p:pic>
+      <p:sp>
+        <p:nvSpPr>
+          <p:cNvPr id="159" name="Google Shape;159;p34"/>
+          <p:cNvSpPr txBox="1">
+            <a:spLocks noGrp="1"/>
+          </p:cNvSpPr>
+          <p:nvPr>
+            <p:ph type="ctrTitle"/>
+          </p:nvPr>
+        </p:nvSpPr>
+        <p:spPr>
+          <a:xfrm>
+            <a:off x="574159" y="56640"/>
+            <a:ext cx="7804298" cy="613271"/>
+          </a:xfrm>
+          <a:prstGeom prst="rect">
+            <a:avLst/>
+          </a:prstGeom>
+        </p:spPr>
+        <p:txBody>
+          <a:bodyPr spcFirstLastPara="1" wrap="square" lIns="91425" tIns="91425" rIns="91425" bIns="91425" anchor="t" anchorCtr="0">
+            <a:noAutofit/>
+          </a:bodyPr>
+          <a:lstStyle/>
+          <a:p>
+            <a:pPr marL="0" lvl="0" indent="0" algn="ctr" rtl="0">
+              <a:spcBef>
+                <a:spcPts val="0"/>
+              </a:spcBef>
+              <a:spcAft>
+                <a:spcPts val="0"/>
+              </a:spcAft>
+              <a:buNone/>
+            </a:pPr>
+            <a:r>
+              <a:rPr lang="sr-Latn-RS" dirty="0"/>
+              <a:t>Komparativna analiza algoritama</a:t>
+            </a:r>
+            <a:r>
+              <a:rPr lang="en-US" dirty="0"/>
+              <a:t> - PCA</a:t>
+            </a:r>
+            <a:endParaRPr dirty="0"/>
+          </a:p>
+        </p:txBody>
+      </p:sp>
+      <p:sp>
+        <p:nvSpPr>
+          <p:cNvPr id="2" name="TextBox 1">
+            <a:extLst>
+              <a:ext uri="{FF2B5EF4-FFF2-40B4-BE49-F238E27FC236}">
+                <a16:creationId xmlns:a16="http://schemas.microsoft.com/office/drawing/2014/main" id="{2A0632BE-A4D3-40D7-A91F-4964B067A359}"/>
+              </a:ext>
+            </a:extLst>
+          </p:cNvPr>
+          <p:cNvSpPr txBox="1"/>
+          <p:nvPr/>
+        </p:nvSpPr>
+        <p:spPr>
+          <a:xfrm>
+            <a:off x="191386" y="669911"/>
+            <a:ext cx="3030279" cy="307777"/>
+          </a:xfrm>
+          <a:prstGeom prst="rect">
+            <a:avLst/>
+          </a:prstGeom>
+          <a:noFill/>
+        </p:spPr>
+        <p:txBody>
+          <a:bodyPr wrap="square" rtlCol="0">
+            <a:spAutoFit/>
+          </a:bodyPr>
+          <a:lstStyle/>
+          <a:p>
+            <a:r>
+              <a:rPr lang="en-US" dirty="0">
+                <a:solidFill>
+                  <a:srgbClr val="FF0000"/>
+                </a:solidFill>
+              </a:rPr>
+              <a:t>16 </a:t>
+            </a:r>
+            <a:r>
+              <a:rPr lang="en-US" dirty="0" err="1">
+                <a:solidFill>
+                  <a:srgbClr val="FF0000"/>
+                </a:solidFill>
+              </a:rPr>
+              <a:t>atributa</a:t>
+            </a:r>
+            <a:endParaRPr lang="en-US" dirty="0">
+              <a:solidFill>
+                <a:srgbClr val="FF0000"/>
+              </a:solidFill>
+            </a:endParaRPr>
+          </a:p>
+        </p:txBody>
+      </p:sp>
+      <p:sp>
+        <p:nvSpPr>
+          <p:cNvPr id="10" name="TextBox 9">
+            <a:extLst>
+              <a:ext uri="{FF2B5EF4-FFF2-40B4-BE49-F238E27FC236}">
+                <a16:creationId xmlns:a16="http://schemas.microsoft.com/office/drawing/2014/main" id="{6E880D56-6604-40F1-8180-804FC4A3EC7F}"/>
+              </a:ext>
+            </a:extLst>
+          </p:cNvPr>
+          <p:cNvSpPr txBox="1"/>
+          <p:nvPr/>
+        </p:nvSpPr>
+        <p:spPr>
+          <a:xfrm>
+            <a:off x="6645349" y="669911"/>
+            <a:ext cx="1222746" cy="307777"/>
+          </a:xfrm>
+          <a:prstGeom prst="rect">
+            <a:avLst/>
+          </a:prstGeom>
+          <a:noFill/>
+        </p:spPr>
+        <p:txBody>
+          <a:bodyPr wrap="square" rtlCol="0">
+            <a:spAutoFit/>
+          </a:bodyPr>
+          <a:lstStyle/>
+          <a:p>
+            <a:r>
+              <a:rPr lang="en-US" dirty="0">
+                <a:solidFill>
+                  <a:srgbClr val="FF0000"/>
+                </a:solidFill>
+              </a:rPr>
+              <a:t>10 </a:t>
+            </a:r>
+            <a:r>
+              <a:rPr lang="en-US" dirty="0" err="1">
+                <a:solidFill>
+                  <a:srgbClr val="FF0000"/>
+                </a:solidFill>
+              </a:rPr>
+              <a:t>atributa</a:t>
+            </a:r>
+            <a:endParaRPr lang="en-US" dirty="0">
+              <a:solidFill>
+                <a:srgbClr val="FF0000"/>
+              </a:solidFill>
+            </a:endParaRPr>
+          </a:p>
+        </p:txBody>
+      </p:sp>
+      <p:cxnSp>
+        <p:nvCxnSpPr>
+          <p:cNvPr id="12" name="Straight Connector 11">
+            <a:extLst>
+              <a:ext uri="{FF2B5EF4-FFF2-40B4-BE49-F238E27FC236}">
+                <a16:creationId xmlns:a16="http://schemas.microsoft.com/office/drawing/2014/main" id="{67A471BB-9D4F-4980-A244-09EA9465E846}"/>
+              </a:ext>
+            </a:extLst>
+          </p:cNvPr>
+          <p:cNvCxnSpPr>
+            <a:cxnSpLocks/>
+          </p:cNvCxnSpPr>
+          <p:nvPr/>
+        </p:nvCxnSpPr>
+        <p:spPr>
+          <a:xfrm>
+            <a:off x="4433777" y="977688"/>
+            <a:ext cx="0" cy="4165812"/>
+          </a:xfrm>
+          <a:prstGeom prst="line">
+            <a:avLst/>
+          </a:prstGeom>
+          <a:ln>
+            <a:solidFill>
+              <a:srgbClr val="FF0000"/>
+            </a:solidFill>
+          </a:ln>
+        </p:spPr>
+        <p:style>
+          <a:lnRef idx="1">
+            <a:schemeClr val="accent1"/>
+          </a:lnRef>
+          <a:fillRef idx="0">
+            <a:schemeClr val="accent1"/>
+          </a:fillRef>
+          <a:effectRef idx="0">
+            <a:schemeClr val="accent1"/>
+          </a:effectRef>
+          <a:fontRef idx="minor">
+            <a:schemeClr val="tx1"/>
+          </a:fontRef>
+        </p:style>
+      </p:cxnSp>
+    </p:spTree>
+    <p:extLst>
+      <p:ext uri="{BB962C8B-B14F-4D97-AF65-F5344CB8AC3E}">
+        <p14:creationId xmlns:p14="http://schemas.microsoft.com/office/powerpoint/2010/main" val="2555063403"/>
+      </p:ext>
+    </p:extLst>
+  </p:cSld>
+  <p:clrMapOvr>
+    <a:masterClrMapping/>
+  </p:clrMapOvr>
+</p:sld>
+</file>
+
+<file path=ppt/slides/slide17.xml><?xml version="1.0" encoding="utf-8"?>
+<p:sld xmlns:a="http://schemas.openxmlformats.org/drawingml/2006/main" xmlns:r="http://schemas.openxmlformats.org/officeDocument/2006/relationships" xmlns:p="http://schemas.openxmlformats.org/presentationml/2006/main">
+  <p:cSld>
+    <p:spTree>
+      <p:nvGrpSpPr>
+        <p:cNvPr id="1" name="Shape 157"/>
+        <p:cNvGrpSpPr/>
+        <p:nvPr/>
+      </p:nvGrpSpPr>
+      <p:grpSpPr>
+        <a:xfrm>
+          <a:off x="0" y="0"/>
+          <a:ext cx="0" cy="0"/>
+          <a:chOff x="0" y="0"/>
+          <a:chExt cx="0" cy="0"/>
+        </a:xfrm>
+      </p:grpSpPr>
+      <p:pic>
+        <p:nvPicPr>
+          <p:cNvPr id="8" name="Picture 7">
+            <a:extLst>
+              <a:ext uri="{FF2B5EF4-FFF2-40B4-BE49-F238E27FC236}">
+                <a16:creationId xmlns:a16="http://schemas.microsoft.com/office/drawing/2014/main" id="{2AA2E1C9-C615-46D3-A31E-FF61A925542E}"/>
+              </a:ext>
+            </a:extLst>
+          </p:cNvPr>
+          <p:cNvPicPr/>
+          <p:nvPr/>
+        </p:nvPicPr>
+        <p:blipFill>
+          <a:blip r:embed="rId3"/>
+          <a:stretch>
+            <a:fillRect/>
+          </a:stretch>
+        </p:blipFill>
+        <p:spPr>
+          <a:xfrm>
+            <a:off x="4433770" y="977688"/>
+            <a:ext cx="4710229" cy="4165812"/>
+          </a:xfrm>
+          <a:prstGeom prst="rect">
+            <a:avLst/>
+          </a:prstGeom>
+        </p:spPr>
+      </p:pic>
+      <p:pic>
+        <p:nvPicPr>
+          <p:cNvPr id="9" name="Picture 8">
+            <a:extLst>
+              <a:ext uri="{FF2B5EF4-FFF2-40B4-BE49-F238E27FC236}">
+                <a16:creationId xmlns:a16="http://schemas.microsoft.com/office/drawing/2014/main" id="{52C4676F-4182-492C-B144-4E5437B242F5}"/>
+              </a:ext>
+            </a:extLst>
+          </p:cNvPr>
+          <p:cNvPicPr/>
+          <p:nvPr/>
+        </p:nvPicPr>
+        <p:blipFill>
+          <a:blip r:embed="rId4"/>
+          <a:stretch>
+            <a:fillRect/>
+          </a:stretch>
+        </p:blipFill>
+        <p:spPr>
+          <a:xfrm>
+            <a:off x="0" y="977688"/>
+            <a:ext cx="4433769" cy="4165812"/>
+          </a:xfrm>
+          <a:prstGeom prst="rect">
+            <a:avLst/>
+          </a:prstGeom>
+        </p:spPr>
+      </p:pic>
+      <p:sp>
+        <p:nvSpPr>
+          <p:cNvPr id="159" name="Google Shape;159;p34"/>
+          <p:cNvSpPr txBox="1">
+            <a:spLocks noGrp="1"/>
+          </p:cNvSpPr>
+          <p:nvPr>
+            <p:ph type="ctrTitle"/>
+          </p:nvPr>
+        </p:nvSpPr>
+        <p:spPr>
+          <a:xfrm>
+            <a:off x="574159" y="56640"/>
+            <a:ext cx="7804298" cy="613271"/>
+          </a:xfrm>
+          <a:prstGeom prst="rect">
+            <a:avLst/>
+          </a:prstGeom>
+        </p:spPr>
+        <p:txBody>
+          <a:bodyPr spcFirstLastPara="1" wrap="square" lIns="91425" tIns="91425" rIns="91425" bIns="91425" anchor="t" anchorCtr="0">
+            <a:noAutofit/>
+          </a:bodyPr>
+          <a:lstStyle/>
+          <a:p>
+            <a:pPr marL="0" lvl="0" indent="0" algn="ctr" rtl="0">
+              <a:spcBef>
+                <a:spcPts val="0"/>
+              </a:spcBef>
+              <a:spcAft>
+                <a:spcPts val="0"/>
+              </a:spcAft>
+              <a:buNone/>
+            </a:pPr>
+            <a:r>
+              <a:rPr lang="sr-Latn-RS" dirty="0"/>
+              <a:t>Komparativna analiza algoritama</a:t>
+            </a:r>
+            <a:r>
+              <a:rPr lang="en-US" dirty="0"/>
+              <a:t> – </a:t>
+            </a:r>
+            <a:r>
+              <a:rPr lang="en-US" dirty="0" err="1"/>
+              <a:t>selekcija</a:t>
+            </a:r>
+            <a:r>
+              <a:rPr lang="en-US" dirty="0"/>
+              <a:t> k</a:t>
+            </a:r>
+            <a:endParaRPr dirty="0"/>
+          </a:p>
+        </p:txBody>
+      </p:sp>
+      <p:sp>
+        <p:nvSpPr>
+          <p:cNvPr id="2" name="TextBox 1">
+            <a:extLst>
+              <a:ext uri="{FF2B5EF4-FFF2-40B4-BE49-F238E27FC236}">
+                <a16:creationId xmlns:a16="http://schemas.microsoft.com/office/drawing/2014/main" id="{2A0632BE-A4D3-40D7-A91F-4964B067A359}"/>
+              </a:ext>
+            </a:extLst>
+          </p:cNvPr>
+          <p:cNvSpPr txBox="1"/>
+          <p:nvPr/>
+        </p:nvSpPr>
+        <p:spPr>
+          <a:xfrm>
+            <a:off x="191386" y="669911"/>
+            <a:ext cx="3030279" cy="307777"/>
+          </a:xfrm>
+          <a:prstGeom prst="rect">
+            <a:avLst/>
+          </a:prstGeom>
+          <a:noFill/>
+        </p:spPr>
+        <p:txBody>
+          <a:bodyPr wrap="square" rtlCol="0">
+            <a:spAutoFit/>
+          </a:bodyPr>
+          <a:lstStyle/>
+          <a:p>
+            <a:r>
+              <a:rPr lang="en-US" dirty="0">
+                <a:solidFill>
+                  <a:srgbClr val="FF0000"/>
+                </a:solidFill>
+              </a:rPr>
+              <a:t>16 </a:t>
+            </a:r>
+            <a:r>
+              <a:rPr lang="en-US" dirty="0" err="1">
+                <a:solidFill>
+                  <a:srgbClr val="FF0000"/>
+                </a:solidFill>
+              </a:rPr>
+              <a:t>atributa</a:t>
+            </a:r>
+            <a:endParaRPr lang="en-US" dirty="0">
+              <a:solidFill>
+                <a:srgbClr val="FF0000"/>
+              </a:solidFill>
+            </a:endParaRPr>
+          </a:p>
+        </p:txBody>
+      </p:sp>
+      <p:sp>
+        <p:nvSpPr>
+          <p:cNvPr id="10" name="TextBox 9">
+            <a:extLst>
+              <a:ext uri="{FF2B5EF4-FFF2-40B4-BE49-F238E27FC236}">
+                <a16:creationId xmlns:a16="http://schemas.microsoft.com/office/drawing/2014/main" id="{6E880D56-6604-40F1-8180-804FC4A3EC7F}"/>
+              </a:ext>
+            </a:extLst>
+          </p:cNvPr>
+          <p:cNvSpPr txBox="1"/>
+          <p:nvPr/>
+        </p:nvSpPr>
+        <p:spPr>
+          <a:xfrm>
+            <a:off x="6645349" y="669911"/>
+            <a:ext cx="1222746" cy="307777"/>
+          </a:xfrm>
+          <a:prstGeom prst="rect">
+            <a:avLst/>
+          </a:prstGeom>
+          <a:noFill/>
+        </p:spPr>
+        <p:txBody>
+          <a:bodyPr wrap="square" rtlCol="0">
+            <a:spAutoFit/>
+          </a:bodyPr>
+          <a:lstStyle/>
+          <a:p>
+            <a:r>
+              <a:rPr lang="en-US" dirty="0">
+                <a:solidFill>
+                  <a:srgbClr val="FF0000"/>
+                </a:solidFill>
+              </a:rPr>
+              <a:t>10 </a:t>
+            </a:r>
+            <a:r>
+              <a:rPr lang="en-US" dirty="0" err="1">
+                <a:solidFill>
+                  <a:srgbClr val="FF0000"/>
+                </a:solidFill>
+              </a:rPr>
+              <a:t>atributa</a:t>
+            </a:r>
+            <a:endParaRPr lang="en-US" dirty="0">
+              <a:solidFill>
+                <a:srgbClr val="FF0000"/>
+              </a:solidFill>
+            </a:endParaRPr>
+          </a:p>
+        </p:txBody>
+      </p:sp>
+      <p:cxnSp>
+        <p:nvCxnSpPr>
+          <p:cNvPr id="12" name="Straight Connector 11">
+            <a:extLst>
+              <a:ext uri="{FF2B5EF4-FFF2-40B4-BE49-F238E27FC236}">
+                <a16:creationId xmlns:a16="http://schemas.microsoft.com/office/drawing/2014/main" id="{67A471BB-9D4F-4980-A244-09EA9465E846}"/>
+              </a:ext>
+            </a:extLst>
+          </p:cNvPr>
+          <p:cNvCxnSpPr>
+            <a:cxnSpLocks/>
+          </p:cNvCxnSpPr>
+          <p:nvPr/>
+        </p:nvCxnSpPr>
+        <p:spPr>
+          <a:xfrm>
+            <a:off x="4433777" y="977688"/>
+            <a:ext cx="0" cy="4165812"/>
+          </a:xfrm>
+          <a:prstGeom prst="line">
+            <a:avLst/>
+          </a:prstGeom>
+          <a:ln>
+            <a:solidFill>
+              <a:srgbClr val="FF0000"/>
+            </a:solidFill>
+          </a:ln>
+        </p:spPr>
+        <p:style>
+          <a:lnRef idx="1">
+            <a:schemeClr val="accent1"/>
+          </a:lnRef>
+          <a:fillRef idx="0">
+            <a:schemeClr val="accent1"/>
+          </a:fillRef>
+          <a:effectRef idx="0">
+            <a:schemeClr val="accent1"/>
+          </a:effectRef>
+          <a:fontRef idx="minor">
+            <a:schemeClr val="tx1"/>
+          </a:fontRef>
+        </p:style>
+      </p:cxnSp>
+    </p:spTree>
+    <p:extLst>
+      <p:ext uri="{BB962C8B-B14F-4D97-AF65-F5344CB8AC3E}">
+        <p14:creationId xmlns:p14="http://schemas.microsoft.com/office/powerpoint/2010/main" val="3603489957"/>
+      </p:ext>
+    </p:extLst>
+  </p:cSld>
+  <p:clrMapOvr>
+    <a:masterClrMapping/>
+  </p:clrMapOvr>
+</p:sld>
+</file>
+
+<file path=ppt/slides/slide18.xml><?xml version="1.0" encoding="utf-8"?>
 <p:sld xmlns:a="http://schemas.openxmlformats.org/drawingml/2006/main" xmlns:r="http://schemas.openxmlformats.org/officeDocument/2006/relationships" xmlns:p="http://schemas.openxmlformats.org/presentationml/2006/main">
   <p:cSld>
     <p:spTree>
@@ -8456,7 +9955,7 @@
 </p:sld>
 </file>
 
-<file path=ppt/slides/slide15.xml><?xml version="1.0" encoding="utf-8"?>
+<file path=ppt/slides/slide19.xml><?xml version="1.0" encoding="utf-8"?>
 <p:sld xmlns:a="http://schemas.openxmlformats.org/drawingml/2006/main" xmlns:r="http://schemas.openxmlformats.org/officeDocument/2006/relationships" xmlns:p="http://schemas.openxmlformats.org/presentationml/2006/main">
   <p:cSld>
     <p:spTree>
@@ -11213,7 +12712,7 @@
         <p:spPr>
           <a:xfrm>
             <a:off x="3774558" y="3088595"/>
-            <a:ext cx="3327991" cy="738664"/>
+            <a:ext cx="3327991" cy="954107"/>
           </a:xfrm>
           <a:prstGeom prst="rect">
             <a:avLst/>
@@ -11232,7 +12731,7 @@
                   <a:srgbClr val="FF0000"/>
                 </a:solidFill>
               </a:rPr>
-              <a:t>Performanse klasifikatora su znatno gore, ako se ne obavi korak dodavanja interakcija.</a:t>
+              <a:t>Performanse klasifikatora su znatno gore kod naivnog Bajesovog algoritma, ako se ne obavi korak dodavanja interakcija.</a:t>
             </a:r>
             <a:endParaRPr lang="en-US" dirty="0">
               <a:solidFill>
@@ -11310,6 +12809,10 @@
               <a:rPr lang="sr-Latn-RS" dirty="0"/>
               <a:t>Preprocesiranje – Redukcija dimanzionalnosti</a:t>
             </a:r>
+            <a:r>
+              <a:rPr lang="en-US" dirty="0"/>
+              <a:t> k=10</a:t>
+            </a:r>
             <a:endParaRPr dirty="0"/>
           </a:p>
         </p:txBody>
@@ -11543,10 +13046,10 @@
       </p:grpSpPr>
       <p:pic>
         <p:nvPicPr>
-          <p:cNvPr id="19" name="Picture 18">
+          <p:cNvPr id="8" name="Picture 7">
             <a:extLst>
               <a:ext uri="{FF2B5EF4-FFF2-40B4-BE49-F238E27FC236}">
-                <a16:creationId xmlns:a16="http://schemas.microsoft.com/office/drawing/2014/main" id="{1F3CE8A6-3E64-4CE1-939D-099F1E710F25}"/>
+                <a16:creationId xmlns:a16="http://schemas.microsoft.com/office/drawing/2014/main" id="{ACDEA5A5-7812-40E0-987A-64476A34B6B7}"/>
               </a:ext>
             </a:extLst>
           </p:cNvPr>
@@ -11561,16 +13064,12 @@
         </p:blipFill>
         <p:spPr>
           <a:xfrm>
-            <a:off x="116958" y="1086957"/>
-            <a:ext cx="5295900" cy="1447800"/>
+            <a:off x="0" y="1086957"/>
+            <a:ext cx="5731510" cy="1588135"/>
           </a:xfrm>
           <a:prstGeom prst="rect">
             <a:avLst/>
           </a:prstGeom>
-          <a:noFill/>
-          <a:ln>
-            <a:noFill/>
-          </a:ln>
         </p:spPr>
       </p:pic>
       <p:sp>
@@ -11610,6 +13109,10 @@
             <a:r>
               <a:rPr lang="sr-Latn-RS" dirty="0"/>
               <a:t>Preprocesiranje – Redukcija dimanzionalnosti</a:t>
+            </a:r>
+            <a:r>
+              <a:rPr lang="en-US" dirty="0"/>
+              <a:t> k=10</a:t>
             </a:r>
             <a:endParaRPr dirty="0"/>
           </a:p>
@@ -11750,10 +13253,10 @@
       </p:sp>
       <p:pic>
         <p:nvPicPr>
-          <p:cNvPr id="20" name="Picture 19">
+          <p:cNvPr id="9" name="Picture 8">
             <a:extLst>
               <a:ext uri="{FF2B5EF4-FFF2-40B4-BE49-F238E27FC236}">
-                <a16:creationId xmlns:a16="http://schemas.microsoft.com/office/drawing/2014/main" id="{AD054E3F-D2A9-4531-BDEA-F125C3F1FA97}"/>
+                <a16:creationId xmlns:a16="http://schemas.microsoft.com/office/drawing/2014/main" id="{BD461C63-C900-4113-8D29-499AC4906792}"/>
               </a:ext>
             </a:extLst>
           </p:cNvPr>
@@ -11768,22 +13271,18 @@
         </p:blipFill>
         <p:spPr>
           <a:xfrm>
-            <a:off x="4173279" y="2251998"/>
-            <a:ext cx="4648200" cy="2638425"/>
+            <a:off x="4204897" y="2190307"/>
+            <a:ext cx="4939103" cy="2594776"/>
           </a:xfrm>
           <a:prstGeom prst="rect">
             <a:avLst/>
           </a:prstGeom>
-          <a:noFill/>
-          <a:ln>
-            <a:noFill/>
-          </a:ln>
         </p:spPr>
       </p:pic>
     </p:spTree>
     <p:extLst>
       <p:ext uri="{BB962C8B-B14F-4D97-AF65-F5344CB8AC3E}">
-        <p14:creationId xmlns:p14="http://schemas.microsoft.com/office/powerpoint/2010/main" val="1137878366"/>
+        <p14:creationId xmlns:p14="http://schemas.microsoft.com/office/powerpoint/2010/main" val="2349776510"/>
       </p:ext>
     </p:extLst>
   </p:cSld>
@@ -11810,12 +13309,98 @@
           <a:chExt cx="0" cy="0"/>
         </a:xfrm>
       </p:grpSpPr>
+      <p:sp>
+        <p:nvSpPr>
+          <p:cNvPr id="159" name="Google Shape;159;p34"/>
+          <p:cNvSpPr txBox="1">
+            <a:spLocks noGrp="1"/>
+          </p:cNvSpPr>
+          <p:nvPr>
+            <p:ph type="ctrTitle"/>
+          </p:nvPr>
+        </p:nvSpPr>
+        <p:spPr>
+          <a:xfrm>
+            <a:off x="574159" y="56640"/>
+            <a:ext cx="7804298" cy="613271"/>
+          </a:xfrm>
+          <a:prstGeom prst="rect">
+            <a:avLst/>
+          </a:prstGeom>
+        </p:spPr>
+        <p:txBody>
+          <a:bodyPr spcFirstLastPara="1" wrap="square" lIns="91425" tIns="91425" rIns="91425" bIns="91425" anchor="t" anchorCtr="0">
+            <a:noAutofit/>
+          </a:bodyPr>
+          <a:lstStyle/>
+          <a:p>
+            <a:pPr marL="0" lvl="0" indent="0" algn="ctr" rtl="0">
+              <a:spcBef>
+                <a:spcPts val="0"/>
+              </a:spcBef>
+              <a:spcAft>
+                <a:spcPts val="0"/>
+              </a:spcAft>
+              <a:buNone/>
+            </a:pPr>
+            <a:r>
+              <a:rPr lang="sr-Latn-RS" dirty="0"/>
+              <a:t>Preprocesiranje </a:t>
+            </a:r>
+            <a:endParaRPr dirty="0"/>
+          </a:p>
+        </p:txBody>
+      </p:sp>
+      <p:sp>
+        <p:nvSpPr>
+          <p:cNvPr id="17" name="TextBox 16">
+            <a:extLst>
+              <a:ext uri="{FF2B5EF4-FFF2-40B4-BE49-F238E27FC236}">
+                <a16:creationId xmlns:a16="http://schemas.microsoft.com/office/drawing/2014/main" id="{D9D29EC4-52C0-41DD-99AF-CE6946B349C2}"/>
+              </a:ext>
+            </a:extLst>
+          </p:cNvPr>
+          <p:cNvSpPr txBox="1"/>
+          <p:nvPr/>
+        </p:nvSpPr>
+        <p:spPr>
+          <a:xfrm>
+            <a:off x="5178056" y="1026324"/>
+            <a:ext cx="2615610" cy="307777"/>
+          </a:xfrm>
+          <a:prstGeom prst="rect">
+            <a:avLst/>
+          </a:prstGeom>
+          <a:noFill/>
+        </p:spPr>
+        <p:txBody>
+          <a:bodyPr wrap="square" rtlCol="0">
+            <a:spAutoFit/>
+          </a:bodyPr>
+          <a:lstStyle/>
+          <a:p>
+            <a:r>
+              <a:rPr lang="sr-Latn-RS" dirty="0">
+                <a:solidFill>
+                  <a:srgbClr val="FF0000"/>
+                </a:solidFill>
+              </a:rPr>
+              <a:t>Kros validacija</a:t>
+            </a:r>
+            <a:endParaRPr lang="en-US" dirty="0">
+              <a:solidFill>
+                <a:srgbClr val="FF0000"/>
+              </a:solidFill>
+            </a:endParaRPr>
+          </a:p>
+        </p:txBody>
+      </p:sp>
       <p:pic>
         <p:nvPicPr>
-          <p:cNvPr id="19" name="Picture 18">
+          <p:cNvPr id="8" name="Picture 7">
             <a:extLst>
               <a:ext uri="{FF2B5EF4-FFF2-40B4-BE49-F238E27FC236}">
-                <a16:creationId xmlns:a16="http://schemas.microsoft.com/office/drawing/2014/main" id="{1F3CE8A6-3E64-4CE1-939D-099F1E710F25}"/>
+                <a16:creationId xmlns:a16="http://schemas.microsoft.com/office/drawing/2014/main" id="{2ADC7C43-89E1-41B5-8E7E-E3B60123FB1B}"/>
               </a:ext>
             </a:extLst>
           </p:cNvPr>
@@ -11830,8 +13415,8 @@
         </p:blipFill>
         <p:spPr>
           <a:xfrm>
-            <a:off x="116958" y="1086957"/>
-            <a:ext cx="5295900" cy="1447800"/>
+            <a:off x="202019" y="908751"/>
+            <a:ext cx="4343400" cy="542925"/>
           </a:xfrm>
           <a:prstGeom prst="rect">
             <a:avLst/>
@@ -11842,66 +13427,24 @@
           </a:ln>
         </p:spPr>
       </p:pic>
-      <p:sp>
-        <p:nvSpPr>
-          <p:cNvPr id="159" name="Google Shape;159;p34"/>
-          <p:cNvSpPr txBox="1">
-            <a:spLocks noGrp="1"/>
-          </p:cNvSpPr>
-          <p:nvPr>
-            <p:ph type="ctrTitle"/>
-          </p:nvPr>
-        </p:nvSpPr>
-        <p:spPr>
-          <a:xfrm>
-            <a:off x="574159" y="56640"/>
-            <a:ext cx="7804298" cy="613271"/>
-          </a:xfrm>
-          <a:prstGeom prst="rect">
-            <a:avLst/>
-          </a:prstGeom>
-        </p:spPr>
-        <p:txBody>
-          <a:bodyPr spcFirstLastPara="1" wrap="square" lIns="91425" tIns="91425" rIns="91425" bIns="91425" anchor="t" anchorCtr="0">
-            <a:noAutofit/>
-          </a:bodyPr>
-          <a:lstStyle/>
-          <a:p>
-            <a:pPr marL="0" lvl="0" indent="0" algn="ctr" rtl="0">
-              <a:spcBef>
-                <a:spcPts val="0"/>
-              </a:spcBef>
-              <a:spcAft>
-                <a:spcPts val="0"/>
-              </a:spcAft>
-              <a:buNone/>
-            </a:pPr>
-            <a:r>
-              <a:rPr lang="sr-Latn-RS" dirty="0"/>
-              <a:t>Preprocesiranje – Redukcija dimanzionalnosti</a:t>
-            </a:r>
-            <a:endParaRPr dirty="0"/>
-          </a:p>
-        </p:txBody>
-      </p:sp>
       <p:cxnSp>
         <p:nvCxnSpPr>
-          <p:cNvPr id="4" name="Straight Arrow Connector 3">
+          <p:cNvPr id="3" name="Straight Arrow Connector 2">
             <a:extLst>
               <a:ext uri="{FF2B5EF4-FFF2-40B4-BE49-F238E27FC236}">
-                <a16:creationId xmlns:a16="http://schemas.microsoft.com/office/drawing/2014/main" id="{68AF3F0C-D857-47F6-A498-82D06242CE57}"/>
+                <a16:creationId xmlns:a16="http://schemas.microsoft.com/office/drawing/2014/main" id="{E6254F47-47AF-4BF7-808D-377486D5F088}"/>
               </a:ext>
             </a:extLst>
           </p:cNvPr>
           <p:cNvCxnSpPr>
-            <a:cxnSpLocks/>
+            <a:endCxn id="8" idx="3"/>
           </p:cNvCxnSpPr>
           <p:nvPr/>
         </p:nvCxnSpPr>
         <p:spPr>
-          <a:xfrm>
-            <a:off x="7421526" y="1180214"/>
-            <a:ext cx="0" cy="925033"/>
+          <a:xfrm flipH="1">
+            <a:off x="4545419" y="1180213"/>
+            <a:ext cx="632637" cy="1"/>
           </a:xfrm>
           <a:prstGeom prst="straightConnector1">
             <a:avLst/>
@@ -11928,25 +13471,100 @@
           </a:fontRef>
         </p:style>
       </p:cxnSp>
+      <p:pic>
+        <p:nvPicPr>
+          <p:cNvPr id="11" name="Picture 10">
+            <a:extLst>
+              <a:ext uri="{FF2B5EF4-FFF2-40B4-BE49-F238E27FC236}">
+                <a16:creationId xmlns:a16="http://schemas.microsoft.com/office/drawing/2014/main" id="{72FE7F5C-A1BC-4894-ADDC-143B08A40ECF}"/>
+              </a:ext>
+            </a:extLst>
+          </p:cNvPr>
+          <p:cNvPicPr/>
+          <p:nvPr/>
+        </p:nvPicPr>
+        <p:blipFill>
+          <a:blip r:embed="rId4"/>
+          <a:stretch>
+            <a:fillRect/>
+          </a:stretch>
+        </p:blipFill>
+        <p:spPr>
+          <a:xfrm>
+            <a:off x="202019" y="3491799"/>
+            <a:ext cx="5686425" cy="942975"/>
+          </a:xfrm>
+          <a:prstGeom prst="rect">
+            <a:avLst/>
+          </a:prstGeom>
+          <a:noFill/>
+          <a:ln>
+            <a:noFill/>
+          </a:ln>
+        </p:spPr>
+      </p:pic>
+      <p:sp>
+        <p:nvSpPr>
+          <p:cNvPr id="5" name="TextBox 4">
+            <a:extLst>
+              <a:ext uri="{FF2B5EF4-FFF2-40B4-BE49-F238E27FC236}">
+                <a16:creationId xmlns:a16="http://schemas.microsoft.com/office/drawing/2014/main" id="{E27A95D0-4CE0-48C2-AD36-6A621DB525CB}"/>
+              </a:ext>
+            </a:extLst>
+          </p:cNvPr>
+          <p:cNvSpPr txBox="1"/>
+          <p:nvPr/>
+        </p:nvSpPr>
+        <p:spPr>
+          <a:xfrm>
+            <a:off x="202019" y="1723138"/>
+            <a:ext cx="6794204" cy="954107"/>
+          </a:xfrm>
+          <a:prstGeom prst="rect">
+            <a:avLst/>
+          </a:prstGeom>
+          <a:noFill/>
+        </p:spPr>
+        <p:txBody>
+          <a:bodyPr wrap="square" rtlCol="0">
+            <a:spAutoFit/>
+          </a:bodyPr>
+          <a:lstStyle/>
+          <a:p>
+            <a:r>
+              <a:rPr lang="sr-Latn-RS" dirty="0">
+                <a:solidFill>
+                  <a:srgbClr val="FF0000"/>
+                </a:solidFill>
+              </a:rPr>
+              <a:t>Priprema neobrađenog skupa podataka, na osnovu koga će se vršiti poređenje. Iz skupa neprocesiranih podataka su izbačene kolone sa nenumeričkim podacima, kao i redovi sa nedostajućim vrednostima. Nenumeričke podatke je neophodno izbaciti, da bi primenjivanje bilo kog algoritma bilo moguće. </a:t>
+            </a:r>
+            <a:endParaRPr lang="en-US" dirty="0">
+              <a:solidFill>
+                <a:srgbClr val="FF0000"/>
+              </a:solidFill>
+            </a:endParaRPr>
+          </a:p>
+        </p:txBody>
+      </p:sp>
       <p:cxnSp>
         <p:nvCxnSpPr>
-          <p:cNvPr id="16" name="Straight Arrow Connector 15">
+          <p:cNvPr id="7" name="Straight Arrow Connector 6">
             <a:extLst>
               <a:ext uri="{FF2B5EF4-FFF2-40B4-BE49-F238E27FC236}">
-                <a16:creationId xmlns:a16="http://schemas.microsoft.com/office/drawing/2014/main" id="{E1B69A60-D232-4186-9BDF-59DF5F15837D}"/>
+                <a16:creationId xmlns:a16="http://schemas.microsoft.com/office/drawing/2014/main" id="{89025F60-00BF-461C-AE21-FB40DEFEC21C}"/>
               </a:ext>
             </a:extLst>
           </p:cNvPr>
           <p:cNvCxnSpPr>
             <a:cxnSpLocks/>
-            <a:stCxn id="17" idx="1"/>
           </p:cNvCxnSpPr>
           <p:nvPr/>
         </p:nvCxnSpPr>
         <p:spPr>
-          <a:xfrm flipH="1">
-            <a:off x="5199321" y="1086957"/>
-            <a:ext cx="914400" cy="384631"/>
+          <a:xfrm>
+            <a:off x="3051544" y="2666399"/>
+            <a:ext cx="542262" cy="942975"/>
           </a:xfrm>
           <a:prstGeom prst="straightConnector1">
             <a:avLst/>
@@ -11973,86 +13591,10 @@
           </a:fontRef>
         </p:style>
       </p:cxnSp>
-      <p:sp>
-        <p:nvSpPr>
-          <p:cNvPr id="17" name="TextBox 16">
-            <a:extLst>
-              <a:ext uri="{FF2B5EF4-FFF2-40B4-BE49-F238E27FC236}">
-                <a16:creationId xmlns:a16="http://schemas.microsoft.com/office/drawing/2014/main" id="{D9D29EC4-52C0-41DD-99AF-CE6946B349C2}"/>
-              </a:ext>
-            </a:extLst>
-          </p:cNvPr>
-          <p:cNvSpPr txBox="1"/>
-          <p:nvPr/>
-        </p:nvSpPr>
-        <p:spPr>
-          <a:xfrm>
-            <a:off x="6113721" y="825347"/>
-            <a:ext cx="2615610" cy="523220"/>
-          </a:xfrm>
-          <a:prstGeom prst="rect">
-            <a:avLst/>
-          </a:prstGeom>
-          <a:noFill/>
-        </p:spPr>
-        <p:txBody>
-          <a:bodyPr wrap="square" rtlCol="0">
-            <a:spAutoFit/>
-          </a:bodyPr>
-          <a:lstStyle/>
-          <a:p>
-            <a:r>
-              <a:rPr lang="sr-Latn-RS" dirty="0">
-                <a:solidFill>
-                  <a:srgbClr val="FF0000"/>
-                </a:solidFill>
-              </a:rPr>
-              <a:t>Selekcija K najrelevantnijih atributa</a:t>
-            </a:r>
-            <a:endParaRPr lang="en-US" dirty="0">
-              <a:solidFill>
-                <a:srgbClr val="FF0000"/>
-              </a:solidFill>
-            </a:endParaRPr>
-          </a:p>
-        </p:txBody>
-      </p:sp>
-      <p:pic>
-        <p:nvPicPr>
-          <p:cNvPr id="20" name="Picture 19">
-            <a:extLst>
-              <a:ext uri="{FF2B5EF4-FFF2-40B4-BE49-F238E27FC236}">
-                <a16:creationId xmlns:a16="http://schemas.microsoft.com/office/drawing/2014/main" id="{AD054E3F-D2A9-4531-BDEA-F125C3F1FA97}"/>
-              </a:ext>
-            </a:extLst>
-          </p:cNvPr>
-          <p:cNvPicPr/>
-          <p:nvPr/>
-        </p:nvPicPr>
-        <p:blipFill>
-          <a:blip r:embed="rId4"/>
-          <a:stretch>
-            <a:fillRect/>
-          </a:stretch>
-        </p:blipFill>
-        <p:spPr>
-          <a:xfrm>
-            <a:off x="4173279" y="2251998"/>
-            <a:ext cx="4648200" cy="2638425"/>
-          </a:xfrm>
-          <a:prstGeom prst="rect">
-            <a:avLst/>
-          </a:prstGeom>
-          <a:noFill/>
-          <a:ln>
-            <a:noFill/>
-          </a:ln>
-        </p:spPr>
-      </p:pic>
     </p:spTree>
     <p:extLst>
       <p:ext uri="{BB962C8B-B14F-4D97-AF65-F5344CB8AC3E}">
-        <p14:creationId xmlns:p14="http://schemas.microsoft.com/office/powerpoint/2010/main" val="2349776510"/>
+        <p14:creationId xmlns:p14="http://schemas.microsoft.com/office/powerpoint/2010/main" val="3505508394"/>
       </p:ext>
     </p:extLst>
   </p:cSld>

</xml_diff>